<commit_message>
added a ManifestVenn alternative diagram
</commit_message>
<xml_diff>
--- a/input/images-source/Images.pptx
+++ b/input/images-source/Images.pptx
@@ -7,12 +7,13 @@
   <p:sldIdLst>
     <p:sldId id="256" r:id="rId2"/>
     <p:sldId id="263" r:id="rId3"/>
-    <p:sldId id="262" r:id="rId4"/>
-    <p:sldId id="259" r:id="rId5"/>
-    <p:sldId id="258" r:id="rId6"/>
-    <p:sldId id="257" r:id="rId7"/>
-    <p:sldId id="260" r:id="rId8"/>
-    <p:sldId id="261" r:id="rId9"/>
+    <p:sldId id="264" r:id="rId4"/>
+    <p:sldId id="262" r:id="rId5"/>
+    <p:sldId id="259" r:id="rId6"/>
+    <p:sldId id="258" r:id="rId7"/>
+    <p:sldId id="257" r:id="rId8"/>
+    <p:sldId id="260" r:id="rId9"/>
+    <p:sldId id="261" r:id="rId10"/>
   </p:sldIdLst>
   <p:sldSz cx="12192000" cy="6858000"/>
   <p:notesSz cx="6858000" cy="9144000"/>
@@ -266,7 +267,7 @@
           <a:p>
             <a:fld id="{8082D830-307A-4A41-90E6-5B657CA86963}" type="datetimeFigureOut">
               <a:rPr lang="en-US" smtClean="0"/>
-              <a:t>1/14/2020</a:t>
+              <a:t>1/15/2020</a:t>
             </a:fld>
             <a:endParaRPr lang="en-US"/>
           </a:p>
@@ -464,7 +465,7 @@
           <a:p>
             <a:fld id="{8082D830-307A-4A41-90E6-5B657CA86963}" type="datetimeFigureOut">
               <a:rPr lang="en-US" smtClean="0"/>
-              <a:t>1/14/2020</a:t>
+              <a:t>1/15/2020</a:t>
             </a:fld>
             <a:endParaRPr lang="en-US"/>
           </a:p>
@@ -672,7 +673,7 @@
           <a:p>
             <a:fld id="{8082D830-307A-4A41-90E6-5B657CA86963}" type="datetimeFigureOut">
               <a:rPr lang="en-US" smtClean="0"/>
-              <a:t>1/14/2020</a:t>
+              <a:t>1/15/2020</a:t>
             </a:fld>
             <a:endParaRPr lang="en-US"/>
           </a:p>
@@ -870,7 +871,7 @@
           <a:p>
             <a:fld id="{8082D830-307A-4A41-90E6-5B657CA86963}" type="datetimeFigureOut">
               <a:rPr lang="en-US" smtClean="0"/>
-              <a:t>1/14/2020</a:t>
+              <a:t>1/15/2020</a:t>
             </a:fld>
             <a:endParaRPr lang="en-US"/>
           </a:p>
@@ -1145,7 +1146,7 @@
           <a:p>
             <a:fld id="{8082D830-307A-4A41-90E6-5B657CA86963}" type="datetimeFigureOut">
               <a:rPr lang="en-US" smtClean="0"/>
-              <a:t>1/14/2020</a:t>
+              <a:t>1/15/2020</a:t>
             </a:fld>
             <a:endParaRPr lang="en-US"/>
           </a:p>
@@ -1410,7 +1411,7 @@
           <a:p>
             <a:fld id="{8082D830-307A-4A41-90E6-5B657CA86963}" type="datetimeFigureOut">
               <a:rPr lang="en-US" smtClean="0"/>
-              <a:t>1/14/2020</a:t>
+              <a:t>1/15/2020</a:t>
             </a:fld>
             <a:endParaRPr lang="en-US"/>
           </a:p>
@@ -1822,7 +1823,7 @@
           <a:p>
             <a:fld id="{8082D830-307A-4A41-90E6-5B657CA86963}" type="datetimeFigureOut">
               <a:rPr lang="en-US" smtClean="0"/>
-              <a:t>1/14/2020</a:t>
+              <a:t>1/15/2020</a:t>
             </a:fld>
             <a:endParaRPr lang="en-US"/>
           </a:p>
@@ -1963,7 +1964,7 @@
           <a:p>
             <a:fld id="{8082D830-307A-4A41-90E6-5B657CA86963}" type="datetimeFigureOut">
               <a:rPr lang="en-US" smtClean="0"/>
-              <a:t>1/14/2020</a:t>
+              <a:t>1/15/2020</a:t>
             </a:fld>
             <a:endParaRPr lang="en-US"/>
           </a:p>
@@ -2076,7 +2077,7 @@
           <a:p>
             <a:fld id="{8082D830-307A-4A41-90E6-5B657CA86963}" type="datetimeFigureOut">
               <a:rPr lang="en-US" smtClean="0"/>
-              <a:t>1/14/2020</a:t>
+              <a:t>1/15/2020</a:t>
             </a:fld>
             <a:endParaRPr lang="en-US"/>
           </a:p>
@@ -2387,7 +2388,7 @@
           <a:p>
             <a:fld id="{8082D830-307A-4A41-90E6-5B657CA86963}" type="datetimeFigureOut">
               <a:rPr lang="en-US" smtClean="0"/>
-              <a:t>1/14/2020</a:t>
+              <a:t>1/15/2020</a:t>
             </a:fld>
             <a:endParaRPr lang="en-US"/>
           </a:p>
@@ -2675,7 +2676,7 @@
           <a:p>
             <a:fld id="{8082D830-307A-4A41-90E6-5B657CA86963}" type="datetimeFigureOut">
               <a:rPr lang="en-US" smtClean="0"/>
-              <a:t>1/14/2020</a:t>
+              <a:t>1/15/2020</a:t>
             </a:fld>
             <a:endParaRPr lang="en-US"/>
           </a:p>
@@ -2916,7 +2917,7 @@
           <a:p>
             <a:fld id="{8082D830-307A-4A41-90E6-5B657CA86963}" type="datetimeFigureOut">
               <a:rPr lang="en-US" smtClean="0"/>
-              <a:t>1/14/2020</a:t>
+              <a:t>1/15/2020</a:t>
             </a:fld>
             <a:endParaRPr lang="en-US"/>
           </a:p>
@@ -3897,10 +3898,86 @@
       </p:grpSpPr>
       <p:sp>
         <p:nvSpPr>
-          <p:cNvPr id="43" name="Rectangle 42">
-            <a:extLst>
-              <a:ext uri="{FF2B5EF4-FFF2-40B4-BE49-F238E27FC236}">
-                <a16:creationId xmlns:a16="http://schemas.microsoft.com/office/drawing/2014/main" id="{0143F21D-9E0E-4FA3-A380-C4FE2B2580B4}"/>
+          <p:cNvPr id="11" name="TextBox 10">
+            <a:extLst>
+              <a:ext uri="{FF2B5EF4-FFF2-40B4-BE49-F238E27FC236}">
+                <a16:creationId xmlns:a16="http://schemas.microsoft.com/office/drawing/2014/main" id="{DA3C5BA5-06F1-41F4-911C-327760E53521}"/>
+              </a:ext>
+            </a:extLst>
+          </p:cNvPr>
+          <p:cNvSpPr txBox="1"/>
+          <p:nvPr/>
+        </p:nvSpPr>
+        <p:spPr>
+          <a:xfrm>
+            <a:off x="5016138" y="2782669"/>
+            <a:ext cx="3277684" cy="646331"/>
+          </a:xfrm>
+          <a:prstGeom prst="rect">
+            <a:avLst/>
+          </a:prstGeom>
+          <a:noFill/>
+        </p:spPr>
+        <p:txBody>
+          <a:bodyPr wrap="square" rtlCol="0">
+            <a:spAutoFit/>
+          </a:bodyPr>
+          <a:lstStyle/>
+          <a:p>
+            <a:r>
+              <a:rPr lang="en-US" dirty="0"/>
+              <a:t>* Minimal required elements</a:t>
+            </a:r>
+          </a:p>
+          <a:p>
+            <a:r>
+              <a:rPr lang="en-US" dirty="0"/>
+              <a:t>* Mapping to XDS SubmissionSet</a:t>
+            </a:r>
+          </a:p>
+        </p:txBody>
+      </p:sp>
+      <p:sp>
+        <p:nvSpPr>
+          <p:cNvPr id="12" name="TextBox 11">
+            <a:extLst>
+              <a:ext uri="{FF2B5EF4-FFF2-40B4-BE49-F238E27FC236}">
+                <a16:creationId xmlns:a16="http://schemas.microsoft.com/office/drawing/2014/main" id="{1C25F9B6-6F22-43B9-A5C5-4E7133F60525}"/>
+              </a:ext>
+            </a:extLst>
+          </p:cNvPr>
+          <p:cNvSpPr txBox="1"/>
+          <p:nvPr/>
+        </p:nvSpPr>
+        <p:spPr>
+          <a:xfrm>
+            <a:off x="6096000" y="4279484"/>
+            <a:ext cx="2542903" cy="369332"/>
+          </a:xfrm>
+          <a:prstGeom prst="rect">
+            <a:avLst/>
+          </a:prstGeom>
+          <a:noFill/>
+        </p:spPr>
+        <p:txBody>
+          <a:bodyPr wrap="square" rtlCol="0">
+            <a:spAutoFit/>
+          </a:bodyPr>
+          <a:lstStyle/>
+          <a:p>
+            <a:r>
+              <a:rPr lang="en-US" dirty="0"/>
+              <a:t>* XDS required elements</a:t>
+            </a:r>
+          </a:p>
+        </p:txBody>
+      </p:sp>
+      <p:sp>
+        <p:nvSpPr>
+          <p:cNvPr id="2" name="Oval 1">
+            <a:extLst>
+              <a:ext uri="{FF2B5EF4-FFF2-40B4-BE49-F238E27FC236}">
+                <a16:creationId xmlns:a16="http://schemas.microsoft.com/office/drawing/2014/main" id="{7B7C2FB0-A68B-406E-970E-1D2FCE8882D1}"/>
               </a:ext>
             </a:extLst>
           </p:cNvPr>
@@ -3909,10 +3986,10 @@
         </p:nvSpPr>
         <p:spPr>
           <a:xfrm>
-            <a:off x="7515497" y="3810270"/>
-            <a:ext cx="4495528" cy="731520"/>
-          </a:xfrm>
-          <a:prstGeom prst="rect">
+            <a:off x="1759131" y="139337"/>
+            <a:ext cx="8055429" cy="6339840"/>
+          </a:xfrm>
+          <a:prstGeom prst="ellipse">
             <a:avLst/>
           </a:prstGeom>
           <a:noFill/>
@@ -3934,32 +4011,26 @@
           </a:fontRef>
         </p:style>
         <p:txBody>
-          <a:bodyPr rtlCol="0" anchor="ctr"/>
-          <a:lstStyle/>
-          <a:p>
-            <a:pPr algn="ctr"/>
-            <a:r>
-              <a:rPr lang="en-US" dirty="0" err="1">
+          <a:bodyPr rtlCol="0" anchor="t"/>
+          <a:lstStyle/>
+          <a:p>
+            <a:r>
+              <a:rPr lang="en-US" b="1" i="1" dirty="0">
                 <a:solidFill>
                   <a:schemeClr val="tx1"/>
                 </a:solidFill>
               </a:rPr>
-              <a:t>Comprehensive.Manifest</a:t>
-            </a:r>
-            <a:endParaRPr lang="en-US" dirty="0">
-              <a:solidFill>
-                <a:schemeClr val="tx1"/>
-              </a:solidFill>
-            </a:endParaRPr>
-          </a:p>
-        </p:txBody>
-      </p:sp>
-      <p:sp>
-        <p:nvSpPr>
-          <p:cNvPr id="44" name="Rectangle 43">
-            <a:extLst>
-              <a:ext uri="{FF2B5EF4-FFF2-40B4-BE49-F238E27FC236}">
-                <a16:creationId xmlns:a16="http://schemas.microsoft.com/office/drawing/2014/main" id="{B2F3DA22-AFE0-48FD-8D74-43B8D0A3AB19}"/>
+              <a:t>FHIR core DocumentManifest</a:t>
+            </a:r>
+          </a:p>
+        </p:txBody>
+      </p:sp>
+      <p:sp>
+        <p:nvSpPr>
+          <p:cNvPr id="8" name="Oval 7">
+            <a:extLst>
+              <a:ext uri="{FF2B5EF4-FFF2-40B4-BE49-F238E27FC236}">
+                <a16:creationId xmlns:a16="http://schemas.microsoft.com/office/drawing/2014/main" id="{63DEE49A-36FA-4770-9811-6DE6FB7EAB0D}"/>
               </a:ext>
             </a:extLst>
           </p:cNvPr>
@@ -3968,10 +4039,10 @@
         </p:nvSpPr>
         <p:spPr>
           <a:xfrm>
-            <a:off x="3696245" y="2754596"/>
-            <a:ext cx="4275908" cy="731520"/>
-          </a:xfrm>
-          <a:prstGeom prst="rect">
+            <a:off x="3556357" y="1811387"/>
+            <a:ext cx="5766168" cy="4426577"/>
+          </a:xfrm>
+          <a:prstGeom prst="ellipse">
             <a:avLst/>
           </a:prstGeom>
           <a:noFill/>
@@ -3993,19 +4064,18 @@
           </a:fontRef>
         </p:style>
         <p:txBody>
-          <a:bodyPr rtlCol="0" anchor="ctr"/>
-          <a:lstStyle/>
-          <a:p>
-            <a:pPr algn="ctr"/>
-            <a:r>
-              <a:rPr lang="en-US" dirty="0" err="1">
+          <a:bodyPr rtlCol="0" anchor="t"/>
+          <a:lstStyle/>
+          <a:p>
+            <a:r>
+              <a:rPr lang="en-US" b="1" i="1" dirty="0" err="1">
                 <a:solidFill>
                   <a:schemeClr val="tx1"/>
                 </a:solidFill>
               </a:rPr>
               <a:t>Minimal.Manifest</a:t>
             </a:r>
-            <a:endParaRPr lang="en-US" dirty="0">
+            <a:endParaRPr lang="en-US" b="1" i="1" dirty="0">
               <a:solidFill>
                 <a:schemeClr val="tx1"/>
               </a:solidFill>
@@ -4015,88 +4085,10 @@
       </p:sp>
       <p:sp>
         <p:nvSpPr>
-          <p:cNvPr id="45" name="TextBox 44">
-            <a:extLst>
-              <a:ext uri="{FF2B5EF4-FFF2-40B4-BE49-F238E27FC236}">
-                <a16:creationId xmlns:a16="http://schemas.microsoft.com/office/drawing/2014/main" id="{5BDB3D04-5E9E-4B10-8B39-9C31E45079B0}"/>
-              </a:ext>
-            </a:extLst>
-          </p:cNvPr>
-          <p:cNvSpPr txBox="1"/>
-          <p:nvPr/>
-        </p:nvSpPr>
-        <p:spPr>
-          <a:xfrm>
-            <a:off x="4581254" y="4176030"/>
-            <a:ext cx="2542903" cy="369332"/>
-          </a:xfrm>
-          <a:prstGeom prst="rect">
-            <a:avLst/>
-          </a:prstGeom>
-          <a:noFill/>
-        </p:spPr>
-        <p:txBody>
-          <a:bodyPr wrap="square" rtlCol="0">
-            <a:spAutoFit/>
-          </a:bodyPr>
-          <a:lstStyle/>
-          <a:p>
-            <a:r>
-              <a:rPr lang="en-US" dirty="0"/>
-              <a:t>+ XDS required elements</a:t>
-            </a:r>
-          </a:p>
-        </p:txBody>
-      </p:sp>
-      <p:cxnSp>
-        <p:nvCxnSpPr>
-          <p:cNvPr id="46" name="Straight Arrow Connector 45">
-            <a:extLst>
-              <a:ext uri="{FF2B5EF4-FFF2-40B4-BE49-F238E27FC236}">
-                <a16:creationId xmlns:a16="http://schemas.microsoft.com/office/drawing/2014/main" id="{1873E97D-85FA-474A-A7C5-2BA7AEFF5C77}"/>
-              </a:ext>
-            </a:extLst>
-          </p:cNvPr>
-          <p:cNvCxnSpPr>
-            <a:cxnSpLocks/>
-            <a:stCxn id="45" idx="0"/>
-            <a:endCxn id="43" idx="1"/>
-          </p:cNvCxnSpPr>
-          <p:nvPr/>
-        </p:nvCxnSpPr>
-        <p:spPr>
-          <a:xfrm>
-            <a:off x="5852706" y="4176030"/>
-            <a:ext cx="1662791" cy="0"/>
-          </a:xfrm>
-          <a:prstGeom prst="straightConnector1">
-            <a:avLst/>
-          </a:prstGeom>
-          <a:ln w="31750">
-            <a:tailEnd type="triangle" w="lg" len="lg"/>
-          </a:ln>
-        </p:spPr>
-        <p:style>
-          <a:lnRef idx="1">
-            <a:schemeClr val="accent1"/>
-          </a:lnRef>
-          <a:fillRef idx="0">
-            <a:schemeClr val="accent1"/>
-          </a:fillRef>
-          <a:effectRef idx="0">
-            <a:schemeClr val="accent1"/>
-          </a:effectRef>
-          <a:fontRef idx="minor">
-            <a:schemeClr val="tx1"/>
-          </a:fontRef>
-        </p:style>
-      </p:cxnSp>
-      <p:sp>
-        <p:nvSpPr>
-          <p:cNvPr id="47" name="Rectangle 46">
-            <a:extLst>
-              <a:ext uri="{FF2B5EF4-FFF2-40B4-BE49-F238E27FC236}">
-                <a16:creationId xmlns:a16="http://schemas.microsoft.com/office/drawing/2014/main" id="{1BF8F4C2-0A50-495C-9C1F-FEE881F4F604}"/>
+          <p:cNvPr id="9" name="Oval 8">
+            <a:extLst>
+              <a:ext uri="{FF2B5EF4-FFF2-40B4-BE49-F238E27FC236}">
+                <a16:creationId xmlns:a16="http://schemas.microsoft.com/office/drawing/2014/main" id="{4A97C4FA-E4C9-4063-AAC9-32457208827D}"/>
               </a:ext>
             </a:extLst>
           </p:cNvPr>
@@ -4105,10 +4097,10 @@
         </p:nvSpPr>
         <p:spPr>
           <a:xfrm>
-            <a:off x="248195" y="1678984"/>
-            <a:ext cx="4275908" cy="731520"/>
-          </a:xfrm>
-          <a:prstGeom prst="rect">
+            <a:off x="5207726" y="3622766"/>
+            <a:ext cx="3609710" cy="2394865"/>
+          </a:xfrm>
+          <a:prstGeom prst="ellipse">
             <a:avLst/>
           </a:prstGeom>
           <a:noFill/>
@@ -4130,191 +4122,29 @@
           </a:fontRef>
         </p:style>
         <p:txBody>
-          <a:bodyPr rtlCol="0" anchor="ctr"/>
-          <a:lstStyle/>
-          <a:p>
-            <a:pPr algn="ctr"/>
-            <a:r>
-              <a:rPr lang="en-US" i="1" dirty="0">
+          <a:bodyPr rtlCol="0" anchor="t"/>
+          <a:lstStyle/>
+          <a:p>
+            <a:r>
+              <a:rPr lang="en-US" b="1" i="1" dirty="0" err="1">
                 <a:solidFill>
                   <a:schemeClr val="tx1"/>
                 </a:solidFill>
               </a:rPr>
-              <a:t>FHIR core DocumentManifest</a:t>
-            </a:r>
-          </a:p>
-        </p:txBody>
-      </p:sp>
-      <p:cxnSp>
-        <p:nvCxnSpPr>
-          <p:cNvPr id="48" name="Straight Arrow Connector 47">
-            <a:extLst>
-              <a:ext uri="{FF2B5EF4-FFF2-40B4-BE49-F238E27FC236}">
-                <a16:creationId xmlns:a16="http://schemas.microsoft.com/office/drawing/2014/main" id="{8AC1BD3B-38A9-40EC-A301-D1885C42FD95}"/>
-              </a:ext>
-            </a:extLst>
-          </p:cNvPr>
-          <p:cNvCxnSpPr>
-            <a:cxnSpLocks/>
-            <a:stCxn id="44" idx="2"/>
-          </p:cNvCxnSpPr>
-          <p:nvPr/>
-        </p:nvCxnSpPr>
-        <p:spPr>
-          <a:xfrm>
-            <a:off x="5834199" y="3486116"/>
-            <a:ext cx="0" cy="689913"/>
-          </a:xfrm>
-          <a:prstGeom prst="straightConnector1">
-            <a:avLst/>
-          </a:prstGeom>
-          <a:ln w="31750">
-            <a:tailEnd type="triangle" w="lg" len="lg"/>
-          </a:ln>
-        </p:spPr>
-        <p:style>
-          <a:lnRef idx="1">
-            <a:schemeClr val="accent1"/>
-          </a:lnRef>
-          <a:fillRef idx="0">
-            <a:schemeClr val="accent1"/>
-          </a:fillRef>
-          <a:effectRef idx="0">
-            <a:schemeClr val="accent1"/>
-          </a:effectRef>
-          <a:fontRef idx="minor">
-            <a:schemeClr val="tx1"/>
-          </a:fontRef>
-        </p:style>
-      </p:cxnSp>
-      <p:sp>
-        <p:nvSpPr>
-          <p:cNvPr id="49" name="TextBox 48">
-            <a:extLst>
-              <a:ext uri="{FF2B5EF4-FFF2-40B4-BE49-F238E27FC236}">
-                <a16:creationId xmlns:a16="http://schemas.microsoft.com/office/drawing/2014/main" id="{FA0E31A3-B404-478D-8A02-AFBF07A77D84}"/>
-              </a:ext>
-            </a:extLst>
-          </p:cNvPr>
-          <p:cNvSpPr txBox="1"/>
-          <p:nvPr/>
-        </p:nvSpPr>
-        <p:spPr>
-          <a:xfrm>
-            <a:off x="400052" y="3116784"/>
-            <a:ext cx="3277684" cy="646331"/>
-          </a:xfrm>
-          <a:prstGeom prst="rect">
-            <a:avLst/>
-          </a:prstGeom>
-          <a:noFill/>
-        </p:spPr>
-        <p:txBody>
-          <a:bodyPr wrap="square" rtlCol="0">
-            <a:spAutoFit/>
-          </a:bodyPr>
-          <a:lstStyle/>
-          <a:p>
-            <a:r>
-              <a:rPr lang="en-US" dirty="0"/>
-              <a:t>* Minimal required elements</a:t>
-            </a:r>
-          </a:p>
-          <a:p>
-            <a:r>
-              <a:rPr lang="en-US" dirty="0"/>
-              <a:t>* Mapping to XDS SubmissionSet</a:t>
-            </a:r>
-          </a:p>
-        </p:txBody>
-      </p:sp>
-      <p:cxnSp>
-        <p:nvCxnSpPr>
-          <p:cNvPr id="50" name="Straight Arrow Connector 49">
-            <a:extLst>
-              <a:ext uri="{FF2B5EF4-FFF2-40B4-BE49-F238E27FC236}">
-                <a16:creationId xmlns:a16="http://schemas.microsoft.com/office/drawing/2014/main" id="{9AE50EB3-736B-43AF-BD18-AC83969E0740}"/>
-              </a:ext>
-            </a:extLst>
-          </p:cNvPr>
-          <p:cNvCxnSpPr>
-            <a:cxnSpLocks/>
-            <a:stCxn id="49" idx="0"/>
-          </p:cNvCxnSpPr>
-          <p:nvPr/>
-        </p:nvCxnSpPr>
-        <p:spPr>
-          <a:xfrm>
-            <a:off x="2038894" y="3116784"/>
-            <a:ext cx="1638845" cy="0"/>
-          </a:xfrm>
-          <a:prstGeom prst="straightConnector1">
-            <a:avLst/>
-          </a:prstGeom>
-          <a:ln w="31750">
-            <a:tailEnd type="triangle" w="lg" len="lg"/>
-          </a:ln>
-        </p:spPr>
-        <p:style>
-          <a:lnRef idx="1">
-            <a:schemeClr val="accent1"/>
-          </a:lnRef>
-          <a:fillRef idx="0">
-            <a:schemeClr val="accent1"/>
-          </a:fillRef>
-          <a:effectRef idx="0">
-            <a:schemeClr val="accent1"/>
-          </a:effectRef>
-          <a:fontRef idx="minor">
-            <a:schemeClr val="tx1"/>
-          </a:fontRef>
-        </p:style>
-      </p:cxnSp>
-      <p:cxnSp>
-        <p:nvCxnSpPr>
-          <p:cNvPr id="51" name="Straight Arrow Connector 50">
-            <a:extLst>
-              <a:ext uri="{FF2B5EF4-FFF2-40B4-BE49-F238E27FC236}">
-                <a16:creationId xmlns:a16="http://schemas.microsoft.com/office/drawing/2014/main" id="{2F4DB51A-4F48-4FE5-BF54-51D2D9CF3F9C}"/>
-              </a:ext>
-            </a:extLst>
-          </p:cNvPr>
-          <p:cNvCxnSpPr>
-            <a:cxnSpLocks/>
-          </p:cNvCxnSpPr>
-          <p:nvPr/>
-        </p:nvCxnSpPr>
-        <p:spPr>
-          <a:xfrm>
-            <a:off x="2210616" y="2409639"/>
-            <a:ext cx="0" cy="689913"/>
-          </a:xfrm>
-          <a:prstGeom prst="straightConnector1">
-            <a:avLst/>
-          </a:prstGeom>
-          <a:ln w="31750">
-            <a:tailEnd type="triangle" w="lg" len="lg"/>
-          </a:ln>
-        </p:spPr>
-        <p:style>
-          <a:lnRef idx="1">
-            <a:schemeClr val="accent1"/>
-          </a:lnRef>
-          <a:fillRef idx="0">
-            <a:schemeClr val="accent1"/>
-          </a:fillRef>
-          <a:effectRef idx="0">
-            <a:schemeClr val="accent1"/>
-          </a:effectRef>
-          <a:fontRef idx="minor">
-            <a:schemeClr val="tx1"/>
-          </a:fontRef>
-        </p:style>
-      </p:cxnSp>
+              <a:t>Comprehensive.Manifest</a:t>
+            </a:r>
+            <a:endParaRPr lang="en-US" b="1" i="1" dirty="0">
+              <a:solidFill>
+                <a:schemeClr val="tx1"/>
+              </a:solidFill>
+            </a:endParaRPr>
+          </a:p>
+        </p:txBody>
+      </p:sp>
     </p:spTree>
     <p:extLst>
       <p:ext uri="{BB962C8B-B14F-4D97-AF65-F5344CB8AC3E}">
-        <p14:creationId xmlns:p14="http://schemas.microsoft.com/office/powerpoint/2010/main" val="538667440"/>
+        <p14:creationId xmlns:p14="http://schemas.microsoft.com/office/powerpoint/2010/main" val="1717112933"/>
       </p:ext>
     </p:extLst>
   </p:cSld>
@@ -4343,10 +4173,10 @@
       </p:grpSpPr>
       <p:sp>
         <p:nvSpPr>
-          <p:cNvPr id="15" name="Rectangle 14">
-            <a:extLst>
-              <a:ext uri="{FF2B5EF4-FFF2-40B4-BE49-F238E27FC236}">
-                <a16:creationId xmlns:a16="http://schemas.microsoft.com/office/drawing/2014/main" id="{CDA266D0-D7D7-4633-97B8-D15E6B3EDD07}"/>
+          <p:cNvPr id="43" name="Rectangle 42">
+            <a:extLst>
+              <a:ext uri="{FF2B5EF4-FFF2-40B4-BE49-F238E27FC236}">
+                <a16:creationId xmlns:a16="http://schemas.microsoft.com/office/drawing/2014/main" id="{0143F21D-9E0E-4FA3-A380-C4FE2B2580B4}"/>
               </a:ext>
             </a:extLst>
           </p:cNvPr>
@@ -4390,7 +4220,7 @@
                   <a:schemeClr val="tx1"/>
                 </a:solidFill>
               </a:rPr>
-              <a:t>Comprehensive.List</a:t>
+              <a:t>Comprehensive.Manifest</a:t>
             </a:r>
             <a:endParaRPr lang="en-US" dirty="0">
               <a:solidFill>
@@ -4402,10 +4232,10 @@
       </p:sp>
       <p:sp>
         <p:nvSpPr>
-          <p:cNvPr id="16" name="Rectangle 15">
-            <a:extLst>
-              <a:ext uri="{FF2B5EF4-FFF2-40B4-BE49-F238E27FC236}">
-                <a16:creationId xmlns:a16="http://schemas.microsoft.com/office/drawing/2014/main" id="{740BDD19-B473-43C0-81F0-B2DC5F75DD7C}"/>
+          <p:cNvPr id="44" name="Rectangle 43">
+            <a:extLst>
+              <a:ext uri="{FF2B5EF4-FFF2-40B4-BE49-F238E27FC236}">
+                <a16:creationId xmlns:a16="http://schemas.microsoft.com/office/drawing/2014/main" id="{B2F3DA22-AFE0-48FD-8D74-43B8D0A3AB19}"/>
               </a:ext>
             </a:extLst>
           </p:cNvPr>
@@ -4449,7 +4279,7 @@
                   <a:schemeClr val="tx1"/>
                 </a:solidFill>
               </a:rPr>
-              <a:t>Minimal.List</a:t>
+              <a:t>Minimal.Manifest</a:t>
             </a:r>
             <a:endParaRPr lang="en-US" dirty="0">
               <a:solidFill>
@@ -4461,10 +4291,10 @@
       </p:sp>
       <p:sp>
         <p:nvSpPr>
-          <p:cNvPr id="17" name="TextBox 16">
-            <a:extLst>
-              <a:ext uri="{FF2B5EF4-FFF2-40B4-BE49-F238E27FC236}">
-                <a16:creationId xmlns:a16="http://schemas.microsoft.com/office/drawing/2014/main" id="{2D5E0D0F-6662-4B69-B3C7-820B2C03385A}"/>
+          <p:cNvPr id="45" name="TextBox 44">
+            <a:extLst>
+              <a:ext uri="{FF2B5EF4-FFF2-40B4-BE49-F238E27FC236}">
+                <a16:creationId xmlns:a16="http://schemas.microsoft.com/office/drawing/2014/main" id="{5BDB3D04-5E9E-4B10-8B39-9C31E45079B0}"/>
               </a:ext>
             </a:extLst>
           </p:cNvPr>
@@ -4496,17 +4326,17 @@
       </p:sp>
       <p:cxnSp>
         <p:nvCxnSpPr>
-          <p:cNvPr id="18" name="Straight Arrow Connector 17">
-            <a:extLst>
-              <a:ext uri="{FF2B5EF4-FFF2-40B4-BE49-F238E27FC236}">
-                <a16:creationId xmlns:a16="http://schemas.microsoft.com/office/drawing/2014/main" id="{C78B0C0F-EF4F-4BBE-8D37-0F9E1DDAFD62}"/>
+          <p:cNvPr id="46" name="Straight Arrow Connector 45">
+            <a:extLst>
+              <a:ext uri="{FF2B5EF4-FFF2-40B4-BE49-F238E27FC236}">
+                <a16:creationId xmlns:a16="http://schemas.microsoft.com/office/drawing/2014/main" id="{1873E97D-85FA-474A-A7C5-2BA7AEFF5C77}"/>
               </a:ext>
             </a:extLst>
           </p:cNvPr>
           <p:cNvCxnSpPr>
             <a:cxnSpLocks/>
-            <a:stCxn id="17" idx="0"/>
-            <a:endCxn id="15" idx="1"/>
+            <a:stCxn id="45" idx="0"/>
+            <a:endCxn id="43" idx="1"/>
           </p:cNvCxnSpPr>
           <p:nvPr/>
         </p:nvCxnSpPr>
@@ -4539,10 +4369,10 @@
       </p:cxnSp>
       <p:sp>
         <p:nvSpPr>
-          <p:cNvPr id="29" name="Rectangle 28">
-            <a:extLst>
-              <a:ext uri="{FF2B5EF4-FFF2-40B4-BE49-F238E27FC236}">
-                <a16:creationId xmlns:a16="http://schemas.microsoft.com/office/drawing/2014/main" id="{05F3DF4E-7D49-4DB9-85CB-9F2993D285AA}"/>
+          <p:cNvPr id="47" name="Rectangle 46">
+            <a:extLst>
+              <a:ext uri="{FF2B5EF4-FFF2-40B4-BE49-F238E27FC236}">
+                <a16:creationId xmlns:a16="http://schemas.microsoft.com/office/drawing/2014/main" id="{1BF8F4C2-0A50-495C-9C1F-FEE881F4F604}"/>
               </a:ext>
             </a:extLst>
           </p:cNvPr>
@@ -4586,23 +4416,23 @@
                   <a:schemeClr val="tx1"/>
                 </a:solidFill>
               </a:rPr>
-              <a:t>FHIR core List</a:t>
+              <a:t>FHIR core DocumentManifest</a:t>
             </a:r>
           </a:p>
         </p:txBody>
       </p:sp>
       <p:cxnSp>
         <p:nvCxnSpPr>
-          <p:cNvPr id="33" name="Straight Arrow Connector 32">
-            <a:extLst>
-              <a:ext uri="{FF2B5EF4-FFF2-40B4-BE49-F238E27FC236}">
-                <a16:creationId xmlns:a16="http://schemas.microsoft.com/office/drawing/2014/main" id="{F4DE99AD-C869-4CEF-BECE-54A0033E882E}"/>
+          <p:cNvPr id="48" name="Straight Arrow Connector 47">
+            <a:extLst>
+              <a:ext uri="{FF2B5EF4-FFF2-40B4-BE49-F238E27FC236}">
+                <a16:creationId xmlns:a16="http://schemas.microsoft.com/office/drawing/2014/main" id="{8AC1BD3B-38A9-40EC-A301-D1885C42FD95}"/>
               </a:ext>
             </a:extLst>
           </p:cNvPr>
           <p:cNvCxnSpPr>
             <a:cxnSpLocks/>
-            <a:stCxn id="16" idx="2"/>
+            <a:stCxn id="44" idx="2"/>
           </p:cNvCxnSpPr>
           <p:nvPr/>
         </p:nvCxnSpPr>
@@ -4635,10 +4465,10 @@
       </p:cxnSp>
       <p:sp>
         <p:nvSpPr>
-          <p:cNvPr id="39" name="TextBox 38">
-            <a:extLst>
-              <a:ext uri="{FF2B5EF4-FFF2-40B4-BE49-F238E27FC236}">
-                <a16:creationId xmlns:a16="http://schemas.microsoft.com/office/drawing/2014/main" id="{AA238C92-7135-4866-BFE9-F983D5F68166}"/>
+          <p:cNvPr id="49" name="TextBox 48">
+            <a:extLst>
+              <a:ext uri="{FF2B5EF4-FFF2-40B4-BE49-F238E27FC236}">
+                <a16:creationId xmlns:a16="http://schemas.microsoft.com/office/drawing/2014/main" id="{FA0E31A3-B404-478D-8A02-AFBF07A77D84}"/>
               </a:ext>
             </a:extLst>
           </p:cNvPr>
@@ -4647,8 +4477,8 @@
         </p:nvSpPr>
         <p:spPr>
           <a:xfrm>
-            <a:off x="743496" y="3116784"/>
-            <a:ext cx="2934240" cy="646331"/>
+            <a:off x="400052" y="3116784"/>
+            <a:ext cx="3277684" cy="646331"/>
           </a:xfrm>
           <a:prstGeom prst="rect">
             <a:avLst/>
@@ -4669,30 +4499,30 @@
           <a:p>
             <a:r>
               <a:rPr lang="en-US" dirty="0"/>
-              <a:t>* Mapping to XDS Folder</a:t>
+              <a:t>* Mapping to XDS SubmissionSet</a:t>
             </a:r>
           </a:p>
         </p:txBody>
       </p:sp>
       <p:cxnSp>
         <p:nvCxnSpPr>
-          <p:cNvPr id="40" name="Straight Arrow Connector 39">
-            <a:extLst>
-              <a:ext uri="{FF2B5EF4-FFF2-40B4-BE49-F238E27FC236}">
-                <a16:creationId xmlns:a16="http://schemas.microsoft.com/office/drawing/2014/main" id="{31D402AA-1B42-404A-B6AB-6F852A3EAE52}"/>
+          <p:cNvPr id="50" name="Straight Arrow Connector 49">
+            <a:extLst>
+              <a:ext uri="{FF2B5EF4-FFF2-40B4-BE49-F238E27FC236}">
+                <a16:creationId xmlns:a16="http://schemas.microsoft.com/office/drawing/2014/main" id="{9AE50EB3-736B-43AF-BD18-AC83969E0740}"/>
               </a:ext>
             </a:extLst>
           </p:cNvPr>
           <p:cNvCxnSpPr>
             <a:cxnSpLocks/>
-            <a:stCxn id="39" idx="0"/>
+            <a:stCxn id="49" idx="0"/>
           </p:cNvCxnSpPr>
           <p:nvPr/>
         </p:nvCxnSpPr>
         <p:spPr>
           <a:xfrm>
-            <a:off x="2210616" y="3116784"/>
-            <a:ext cx="1467123" cy="0"/>
+            <a:off x="2038894" y="3116784"/>
+            <a:ext cx="1638845" cy="0"/>
           </a:xfrm>
           <a:prstGeom prst="straightConnector1">
             <a:avLst/>
@@ -4718,10 +4548,10 @@
       </p:cxnSp>
       <p:cxnSp>
         <p:nvCxnSpPr>
-          <p:cNvPr id="41" name="Straight Arrow Connector 40">
-            <a:extLst>
-              <a:ext uri="{FF2B5EF4-FFF2-40B4-BE49-F238E27FC236}">
-                <a16:creationId xmlns:a16="http://schemas.microsoft.com/office/drawing/2014/main" id="{93C8692E-62FF-4930-B6B5-222BF5CE7609}"/>
+          <p:cNvPr id="51" name="Straight Arrow Connector 50">
+            <a:extLst>
+              <a:ext uri="{FF2B5EF4-FFF2-40B4-BE49-F238E27FC236}">
+                <a16:creationId xmlns:a16="http://schemas.microsoft.com/office/drawing/2014/main" id="{2F4DB51A-4F48-4FE5-BF54-51D2D9CF3F9C}"/>
               </a:ext>
             </a:extLst>
           </p:cNvPr>
@@ -4760,7 +4590,7 @@
     </p:spTree>
     <p:extLst>
       <p:ext uri="{BB962C8B-B14F-4D97-AF65-F5344CB8AC3E}">
-        <p14:creationId xmlns:p14="http://schemas.microsoft.com/office/powerpoint/2010/main" val="1099659358"/>
+        <p14:creationId xmlns:p14="http://schemas.microsoft.com/office/powerpoint/2010/main" val="538667440"/>
       </p:ext>
     </p:extLst>
   </p:cSld>
@@ -4789,10 +4619,10 @@
       </p:grpSpPr>
       <p:sp>
         <p:nvSpPr>
-          <p:cNvPr id="4" name="Rectangle 3">
-            <a:extLst>
-              <a:ext uri="{FF2B5EF4-FFF2-40B4-BE49-F238E27FC236}">
-                <a16:creationId xmlns:a16="http://schemas.microsoft.com/office/drawing/2014/main" id="{7414FFF1-F365-4AC3-81EE-7FCA96F34F9C}"/>
+          <p:cNvPr id="15" name="Rectangle 14">
+            <a:extLst>
+              <a:ext uri="{FF2B5EF4-FFF2-40B4-BE49-F238E27FC236}">
+                <a16:creationId xmlns:a16="http://schemas.microsoft.com/office/drawing/2014/main" id="{CDA266D0-D7D7-4633-97B8-D15E6B3EDD07}"/>
               </a:ext>
             </a:extLst>
           </p:cNvPr>
@@ -4801,7 +4631,7 @@
         </p:nvSpPr>
         <p:spPr>
           <a:xfrm>
-            <a:off x="7515497" y="4333603"/>
+            <a:off x="7515497" y="3810270"/>
             <a:ext cx="4495528" cy="731520"/>
           </a:xfrm>
           <a:prstGeom prst="rect">
@@ -4836,7 +4666,7 @@
                   <a:schemeClr val="tx1"/>
                 </a:solidFill>
               </a:rPr>
-              <a:t>Query.Comprehensive.DocumentReference</a:t>
+              <a:t>Comprehensive.List</a:t>
             </a:r>
             <a:endParaRPr lang="en-US" dirty="0">
               <a:solidFill>
@@ -4848,10 +4678,10 @@
       </p:sp>
       <p:sp>
         <p:nvSpPr>
-          <p:cNvPr id="5" name="Rectangle 4">
-            <a:extLst>
-              <a:ext uri="{FF2B5EF4-FFF2-40B4-BE49-F238E27FC236}">
-                <a16:creationId xmlns:a16="http://schemas.microsoft.com/office/drawing/2014/main" id="{B82C8EC1-3A34-485F-B41F-7BB4082128B9}"/>
+          <p:cNvPr id="16" name="Rectangle 15">
+            <a:extLst>
+              <a:ext uri="{FF2B5EF4-FFF2-40B4-BE49-F238E27FC236}">
+                <a16:creationId xmlns:a16="http://schemas.microsoft.com/office/drawing/2014/main" id="{740BDD19-B473-43C0-81F0-B2DC5F75DD7C}"/>
               </a:ext>
             </a:extLst>
           </p:cNvPr>
@@ -4860,7 +4690,7 @@
         </p:nvSpPr>
         <p:spPr>
           <a:xfrm>
-            <a:off x="248195" y="4333603"/>
+            <a:off x="3696245" y="2754596"/>
             <a:ext cx="4275908" cy="731520"/>
           </a:xfrm>
           <a:prstGeom prst="rect">
@@ -4895,7 +4725,7 @@
                   <a:schemeClr val="tx1"/>
                 </a:solidFill>
               </a:rPr>
-              <a:t>Query.Minimal.DocumentReference</a:t>
+              <a:t>Minimal.List</a:t>
             </a:r>
             <a:endParaRPr lang="en-US" dirty="0">
               <a:solidFill>
@@ -4907,10 +4737,88 @@
       </p:sp>
       <p:sp>
         <p:nvSpPr>
-          <p:cNvPr id="19" name="Rectangle 18">
-            <a:extLst>
-              <a:ext uri="{FF2B5EF4-FFF2-40B4-BE49-F238E27FC236}">
-                <a16:creationId xmlns:a16="http://schemas.microsoft.com/office/drawing/2014/main" id="{B8747771-B4C1-4D89-9B93-12A8ABC31D8F}"/>
+          <p:cNvPr id="17" name="TextBox 16">
+            <a:extLst>
+              <a:ext uri="{FF2B5EF4-FFF2-40B4-BE49-F238E27FC236}">
+                <a16:creationId xmlns:a16="http://schemas.microsoft.com/office/drawing/2014/main" id="{2D5E0D0F-6662-4B69-B3C7-820B2C03385A}"/>
+              </a:ext>
+            </a:extLst>
+          </p:cNvPr>
+          <p:cNvSpPr txBox="1"/>
+          <p:nvPr/>
+        </p:nvSpPr>
+        <p:spPr>
+          <a:xfrm>
+            <a:off x="4581254" y="4176030"/>
+            <a:ext cx="2542903" cy="369332"/>
+          </a:xfrm>
+          <a:prstGeom prst="rect">
+            <a:avLst/>
+          </a:prstGeom>
+          <a:noFill/>
+        </p:spPr>
+        <p:txBody>
+          <a:bodyPr wrap="square" rtlCol="0">
+            <a:spAutoFit/>
+          </a:bodyPr>
+          <a:lstStyle/>
+          <a:p>
+            <a:r>
+              <a:rPr lang="en-US" dirty="0"/>
+              <a:t>+ XDS required elements</a:t>
+            </a:r>
+          </a:p>
+        </p:txBody>
+      </p:sp>
+      <p:cxnSp>
+        <p:nvCxnSpPr>
+          <p:cNvPr id="18" name="Straight Arrow Connector 17">
+            <a:extLst>
+              <a:ext uri="{FF2B5EF4-FFF2-40B4-BE49-F238E27FC236}">
+                <a16:creationId xmlns:a16="http://schemas.microsoft.com/office/drawing/2014/main" id="{C78B0C0F-EF4F-4BBE-8D37-0F9E1DDAFD62}"/>
+              </a:ext>
+            </a:extLst>
+          </p:cNvPr>
+          <p:cNvCxnSpPr>
+            <a:cxnSpLocks/>
+            <a:stCxn id="17" idx="0"/>
+            <a:endCxn id="15" idx="1"/>
+          </p:cNvCxnSpPr>
+          <p:nvPr/>
+        </p:nvCxnSpPr>
+        <p:spPr>
+          <a:xfrm>
+            <a:off x="5852706" y="4176030"/>
+            <a:ext cx="1662791" cy="0"/>
+          </a:xfrm>
+          <a:prstGeom prst="straightConnector1">
+            <a:avLst/>
+          </a:prstGeom>
+          <a:ln w="31750">
+            <a:tailEnd type="triangle" w="lg" len="lg"/>
+          </a:ln>
+        </p:spPr>
+        <p:style>
+          <a:lnRef idx="1">
+            <a:schemeClr val="accent1"/>
+          </a:lnRef>
+          <a:fillRef idx="0">
+            <a:schemeClr val="accent1"/>
+          </a:fillRef>
+          <a:effectRef idx="0">
+            <a:schemeClr val="accent1"/>
+          </a:effectRef>
+          <a:fontRef idx="minor">
+            <a:schemeClr val="tx1"/>
+          </a:fontRef>
+        </p:style>
+      </p:cxnSp>
+      <p:sp>
+        <p:nvSpPr>
+          <p:cNvPr id="29" name="Rectangle 28">
+            <a:extLst>
+              <a:ext uri="{FF2B5EF4-FFF2-40B4-BE49-F238E27FC236}">
+                <a16:creationId xmlns:a16="http://schemas.microsoft.com/office/drawing/2014/main" id="{05F3DF4E-7D49-4DB9-85CB-9F2993D285AA}"/>
               </a:ext>
             </a:extLst>
           </p:cNvPr>
@@ -4919,8 +4827,8 @@
         </p:nvSpPr>
         <p:spPr>
           <a:xfrm>
-            <a:off x="7515497" y="2748643"/>
-            <a:ext cx="4495528" cy="731520"/>
+            <a:off x="248195" y="1678984"/>
+            <a:ext cx="4275908" cy="731520"/>
           </a:xfrm>
           <a:prstGeom prst="rect">
             <a:avLst/>
@@ -4949,86 +4857,64 @@
           <a:p>
             <a:pPr algn="ctr"/>
             <a:r>
-              <a:rPr lang="en-US" dirty="0" err="1">
+              <a:rPr lang="en-US" i="1" dirty="0">
                 <a:solidFill>
                   <a:schemeClr val="tx1"/>
                 </a:solidFill>
               </a:rPr>
-              <a:t>Provide.Comprehensive.DocumentReference</a:t>
-            </a:r>
-            <a:endParaRPr lang="en-US" dirty="0">
-              <a:solidFill>
-                <a:schemeClr val="tx1"/>
-              </a:solidFill>
-            </a:endParaRPr>
-          </a:p>
-        </p:txBody>
-      </p:sp>
-      <p:sp>
-        <p:nvSpPr>
-          <p:cNvPr id="20" name="Rectangle 19">
-            <a:extLst>
-              <a:ext uri="{FF2B5EF4-FFF2-40B4-BE49-F238E27FC236}">
-                <a16:creationId xmlns:a16="http://schemas.microsoft.com/office/drawing/2014/main" id="{F696F8CF-D1C0-47CB-8A68-AAC82B1FE9FB}"/>
-              </a:ext>
-            </a:extLst>
-          </p:cNvPr>
-          <p:cNvSpPr/>
-          <p:nvPr/>
-        </p:nvSpPr>
-        <p:spPr>
-          <a:xfrm>
-            <a:off x="248195" y="2748643"/>
-            <a:ext cx="4275908" cy="731520"/>
-          </a:xfrm>
-          <a:prstGeom prst="rect">
-            <a:avLst/>
-          </a:prstGeom>
-          <a:noFill/>
+              <a:t>FHIR core List</a:t>
+            </a:r>
+          </a:p>
+        </p:txBody>
+      </p:sp>
+      <p:cxnSp>
+        <p:nvCxnSpPr>
+          <p:cNvPr id="33" name="Straight Arrow Connector 32">
+            <a:extLst>
+              <a:ext uri="{FF2B5EF4-FFF2-40B4-BE49-F238E27FC236}">
+                <a16:creationId xmlns:a16="http://schemas.microsoft.com/office/drawing/2014/main" id="{F4DE99AD-C869-4CEF-BECE-54A0033E882E}"/>
+              </a:ext>
+            </a:extLst>
+          </p:cNvPr>
+          <p:cNvCxnSpPr>
+            <a:cxnSpLocks/>
+            <a:stCxn id="16" idx="2"/>
+          </p:cNvCxnSpPr>
+          <p:nvPr/>
+        </p:nvCxnSpPr>
+        <p:spPr>
+          <a:xfrm>
+            <a:off x="5834199" y="3486116"/>
+            <a:ext cx="0" cy="689913"/>
+          </a:xfrm>
+          <a:prstGeom prst="straightConnector1">
+            <a:avLst/>
+          </a:prstGeom>
+          <a:ln w="31750">
+            <a:tailEnd type="triangle" w="lg" len="lg"/>
+          </a:ln>
         </p:spPr>
         <p:style>
-          <a:lnRef idx="2">
-            <a:schemeClr val="accent1">
-              <a:shade val="50000"/>
-            </a:schemeClr>
+          <a:lnRef idx="1">
+            <a:schemeClr val="accent1"/>
           </a:lnRef>
-          <a:fillRef idx="1">
+          <a:fillRef idx="0">
             <a:schemeClr val="accent1"/>
           </a:fillRef>
           <a:effectRef idx="0">
             <a:schemeClr val="accent1"/>
           </a:effectRef>
           <a:fontRef idx="minor">
-            <a:schemeClr val="lt1"/>
+            <a:schemeClr val="tx1"/>
           </a:fontRef>
         </p:style>
-        <p:txBody>
-          <a:bodyPr rtlCol="0" anchor="ctr"/>
-          <a:lstStyle/>
-          <a:p>
-            <a:pPr algn="ctr"/>
-            <a:r>
-              <a:rPr lang="en-US" dirty="0" err="1">
-                <a:solidFill>
-                  <a:schemeClr val="tx1"/>
-                </a:solidFill>
-              </a:rPr>
-              <a:t>Provide.Minimal.DocumentReference</a:t>
-            </a:r>
-            <a:endParaRPr lang="en-US" dirty="0">
-              <a:solidFill>
-                <a:schemeClr val="tx1"/>
-              </a:solidFill>
-            </a:endParaRPr>
-          </a:p>
-        </p:txBody>
-      </p:sp>
-      <p:sp>
-        <p:nvSpPr>
-          <p:cNvPr id="21" name="TextBox 20">
-            <a:extLst>
-              <a:ext uri="{FF2B5EF4-FFF2-40B4-BE49-F238E27FC236}">
-                <a16:creationId xmlns:a16="http://schemas.microsoft.com/office/drawing/2014/main" id="{47D7A85F-4761-4261-AFE3-63BDE635DC40}"/>
+      </p:cxnSp>
+      <p:sp>
+        <p:nvSpPr>
+          <p:cNvPr id="39" name="TextBox 38">
+            <a:extLst>
+              <a:ext uri="{FF2B5EF4-FFF2-40B4-BE49-F238E27FC236}">
+                <a16:creationId xmlns:a16="http://schemas.microsoft.com/office/drawing/2014/main" id="{AA238C92-7135-4866-BFE9-F983D5F68166}"/>
               </a:ext>
             </a:extLst>
           </p:cNvPr>
@@ -5037,8 +4923,8 @@
         </p:nvSpPr>
         <p:spPr>
           <a:xfrm>
-            <a:off x="4676504" y="2990309"/>
-            <a:ext cx="2542903" cy="369332"/>
+            <a:off x="743496" y="3116784"/>
+            <a:ext cx="2934240" cy="646331"/>
           </a:xfrm>
           <a:prstGeom prst="rect">
             <a:avLst/>
@@ -5053,27 +4939,36 @@
           <a:p>
             <a:r>
               <a:rPr lang="en-US" dirty="0"/>
-              <a:t>+ XDS required elements</a:t>
+              <a:t>* Minimal required elements</a:t>
+            </a:r>
+          </a:p>
+          <a:p>
+            <a:r>
+              <a:rPr lang="en-US" dirty="0"/>
+              <a:t>* Mapping to XDS Folder</a:t>
             </a:r>
           </a:p>
         </p:txBody>
       </p:sp>
       <p:cxnSp>
         <p:nvCxnSpPr>
-          <p:cNvPr id="22" name="Straight Arrow Connector 21">
-            <a:extLst>
-              <a:ext uri="{FF2B5EF4-FFF2-40B4-BE49-F238E27FC236}">
-                <a16:creationId xmlns:a16="http://schemas.microsoft.com/office/drawing/2014/main" id="{EDABF35E-3560-437C-9E53-A393D3FB56C2}"/>
-              </a:ext>
-            </a:extLst>
-          </p:cNvPr>
-          <p:cNvCxnSpPr/>
+          <p:cNvPr id="40" name="Straight Arrow Connector 39">
+            <a:extLst>
+              <a:ext uri="{FF2B5EF4-FFF2-40B4-BE49-F238E27FC236}">
+                <a16:creationId xmlns:a16="http://schemas.microsoft.com/office/drawing/2014/main" id="{31D402AA-1B42-404A-B6AB-6F852A3EAE52}"/>
+              </a:ext>
+            </a:extLst>
+          </p:cNvPr>
+          <p:cNvCxnSpPr>
+            <a:cxnSpLocks/>
+            <a:stCxn id="39" idx="0"/>
+          </p:cNvCxnSpPr>
           <p:nvPr/>
         </p:nvCxnSpPr>
         <p:spPr>
           <a:xfrm>
-            <a:off x="4524103" y="2976311"/>
-            <a:ext cx="2991394" cy="0"/>
+            <a:off x="2210616" y="3116784"/>
+            <a:ext cx="1467123" cy="0"/>
           </a:xfrm>
           <a:prstGeom prst="straightConnector1">
             <a:avLst/>
@@ -5099,24 +4994,22 @@
       </p:cxnSp>
       <p:cxnSp>
         <p:nvCxnSpPr>
-          <p:cNvPr id="23" name="Straight Arrow Connector 22">
-            <a:extLst>
-              <a:ext uri="{FF2B5EF4-FFF2-40B4-BE49-F238E27FC236}">
-                <a16:creationId xmlns:a16="http://schemas.microsoft.com/office/drawing/2014/main" id="{C163C91F-D1C6-44C6-8D1B-BC256B5E432F}"/>
+          <p:cNvPr id="41" name="Straight Arrow Connector 40">
+            <a:extLst>
+              <a:ext uri="{FF2B5EF4-FFF2-40B4-BE49-F238E27FC236}">
+                <a16:creationId xmlns:a16="http://schemas.microsoft.com/office/drawing/2014/main" id="{93C8692E-62FF-4930-B6B5-222BF5CE7609}"/>
               </a:ext>
             </a:extLst>
           </p:cNvPr>
           <p:cNvCxnSpPr>
             <a:cxnSpLocks/>
-            <a:stCxn id="20" idx="2"/>
-            <a:endCxn id="5" idx="0"/>
           </p:cNvCxnSpPr>
           <p:nvPr/>
         </p:nvCxnSpPr>
         <p:spPr>
           <a:xfrm>
-            <a:off x="2386149" y="3480163"/>
-            <a:ext cx="0" cy="853440"/>
+            <a:off x="2210616" y="2409639"/>
+            <a:ext cx="0" cy="689913"/>
           </a:xfrm>
           <a:prstGeom prst="straightConnector1">
             <a:avLst/>
@@ -5140,260 +5033,10 @@
           </a:fontRef>
         </p:style>
       </p:cxnSp>
-      <p:sp>
-        <p:nvSpPr>
-          <p:cNvPr id="26" name="TextBox 25">
-            <a:extLst>
-              <a:ext uri="{FF2B5EF4-FFF2-40B4-BE49-F238E27FC236}">
-                <a16:creationId xmlns:a16="http://schemas.microsoft.com/office/drawing/2014/main" id="{ACC0A076-9F8A-4B49-84F8-CF842E01BFD3}"/>
-              </a:ext>
-            </a:extLst>
-          </p:cNvPr>
-          <p:cNvSpPr txBox="1"/>
-          <p:nvPr/>
-        </p:nvSpPr>
-        <p:spPr>
-          <a:xfrm>
-            <a:off x="2407920" y="3772607"/>
-            <a:ext cx="2542903" cy="369332"/>
-          </a:xfrm>
-          <a:prstGeom prst="rect">
-            <a:avLst/>
-          </a:prstGeom>
-          <a:noFill/>
-        </p:spPr>
-        <p:txBody>
-          <a:bodyPr wrap="square" rtlCol="0">
-            <a:spAutoFit/>
-          </a:bodyPr>
-          <a:lstStyle/>
-          <a:p>
-            <a:r>
-              <a:rPr lang="en-US" dirty="0"/>
-              <a:t>+ Identifier</a:t>
-            </a:r>
-          </a:p>
-        </p:txBody>
-      </p:sp>
-      <p:cxnSp>
-        <p:nvCxnSpPr>
-          <p:cNvPr id="27" name="Straight Arrow Connector 26">
-            <a:extLst>
-              <a:ext uri="{FF2B5EF4-FFF2-40B4-BE49-F238E27FC236}">
-                <a16:creationId xmlns:a16="http://schemas.microsoft.com/office/drawing/2014/main" id="{809642C2-138F-4120-9174-59D5D53E5CF1}"/>
-              </a:ext>
-            </a:extLst>
-          </p:cNvPr>
-          <p:cNvCxnSpPr>
-            <a:cxnSpLocks/>
-            <a:stCxn id="19" idx="2"/>
-          </p:cNvCxnSpPr>
-          <p:nvPr/>
-        </p:nvCxnSpPr>
-        <p:spPr>
-          <a:xfrm flipH="1">
-            <a:off x="9762309" y="3480163"/>
-            <a:ext cx="952" cy="855679"/>
-          </a:xfrm>
-          <a:prstGeom prst="straightConnector1">
-            <a:avLst/>
-          </a:prstGeom>
-          <a:ln w="31750">
-            <a:tailEnd type="triangle" w="lg" len="lg"/>
-          </a:ln>
-        </p:spPr>
-        <p:style>
-          <a:lnRef idx="1">
-            <a:schemeClr val="accent1"/>
-          </a:lnRef>
-          <a:fillRef idx="0">
-            <a:schemeClr val="accent1"/>
-          </a:fillRef>
-          <a:effectRef idx="0">
-            <a:schemeClr val="accent1"/>
-          </a:effectRef>
-          <a:fontRef idx="minor">
-            <a:schemeClr val="tx1"/>
-          </a:fontRef>
-        </p:style>
-      </p:cxnSp>
-      <p:sp>
-        <p:nvSpPr>
-          <p:cNvPr id="28" name="TextBox 27">
-            <a:extLst>
-              <a:ext uri="{FF2B5EF4-FFF2-40B4-BE49-F238E27FC236}">
-                <a16:creationId xmlns:a16="http://schemas.microsoft.com/office/drawing/2014/main" id="{53E14C99-35D7-4BB4-A0D2-DAE1885A53CD}"/>
-              </a:ext>
-            </a:extLst>
-          </p:cNvPr>
-          <p:cNvSpPr txBox="1"/>
-          <p:nvPr/>
-        </p:nvSpPr>
-        <p:spPr>
-          <a:xfrm>
-            <a:off x="9784080" y="3774846"/>
-            <a:ext cx="2542903" cy="369332"/>
-          </a:xfrm>
-          <a:prstGeom prst="rect">
-            <a:avLst/>
-          </a:prstGeom>
-          <a:noFill/>
-        </p:spPr>
-        <p:txBody>
-          <a:bodyPr wrap="square" rtlCol="0">
-            <a:spAutoFit/>
-          </a:bodyPr>
-          <a:lstStyle/>
-          <a:p>
-            <a:r>
-              <a:rPr lang="en-US" dirty="0"/>
-              <a:t>+ Identifier</a:t>
-            </a:r>
-          </a:p>
-        </p:txBody>
-      </p:sp>
-      <p:sp>
-        <p:nvSpPr>
-          <p:cNvPr id="24" name="Rectangle 23">
-            <a:extLst>
-              <a:ext uri="{FF2B5EF4-FFF2-40B4-BE49-F238E27FC236}">
-                <a16:creationId xmlns:a16="http://schemas.microsoft.com/office/drawing/2014/main" id="{C00F57E2-7EAB-4C73-A4C0-A3920E06366B}"/>
-              </a:ext>
-            </a:extLst>
-          </p:cNvPr>
-          <p:cNvSpPr/>
-          <p:nvPr/>
-        </p:nvSpPr>
-        <p:spPr>
-          <a:xfrm>
-            <a:off x="248195" y="1043668"/>
-            <a:ext cx="4275908" cy="731520"/>
-          </a:xfrm>
-          <a:prstGeom prst="rect">
-            <a:avLst/>
-          </a:prstGeom>
-          <a:noFill/>
-        </p:spPr>
-        <p:style>
-          <a:lnRef idx="2">
-            <a:schemeClr val="accent1">
-              <a:shade val="50000"/>
-            </a:schemeClr>
-          </a:lnRef>
-          <a:fillRef idx="1">
-            <a:schemeClr val="accent1"/>
-          </a:fillRef>
-          <a:effectRef idx="0">
-            <a:schemeClr val="accent1"/>
-          </a:effectRef>
-          <a:fontRef idx="minor">
-            <a:schemeClr val="lt1"/>
-          </a:fontRef>
-        </p:style>
-        <p:txBody>
-          <a:bodyPr rtlCol="0" anchor="ctr"/>
-          <a:lstStyle/>
-          <a:p>
-            <a:pPr algn="ctr"/>
-            <a:r>
-              <a:rPr lang="en-US" i="1" dirty="0">
-                <a:solidFill>
-                  <a:schemeClr val="tx1"/>
-                </a:solidFill>
-              </a:rPr>
-              <a:t>FHIR core DocumentReference</a:t>
-            </a:r>
-          </a:p>
-        </p:txBody>
-      </p:sp>
-      <p:cxnSp>
-        <p:nvCxnSpPr>
-          <p:cNvPr id="25" name="Straight Arrow Connector 24">
-            <a:extLst>
-              <a:ext uri="{FF2B5EF4-FFF2-40B4-BE49-F238E27FC236}">
-                <a16:creationId xmlns:a16="http://schemas.microsoft.com/office/drawing/2014/main" id="{6FCF5A7E-6107-4D1F-B8FC-D952AED26AF8}"/>
-              </a:ext>
-            </a:extLst>
-          </p:cNvPr>
-          <p:cNvCxnSpPr>
-            <a:cxnSpLocks/>
-            <a:stCxn id="24" idx="2"/>
-            <a:endCxn id="20" idx="0"/>
-          </p:cNvCxnSpPr>
-          <p:nvPr/>
-        </p:nvCxnSpPr>
-        <p:spPr>
-          <a:xfrm>
-            <a:off x="2386149" y="1775188"/>
-            <a:ext cx="0" cy="973455"/>
-          </a:xfrm>
-          <a:prstGeom prst="straightConnector1">
-            <a:avLst/>
-          </a:prstGeom>
-          <a:ln w="31750">
-            <a:tailEnd type="triangle" w="lg" len="lg"/>
-          </a:ln>
-        </p:spPr>
-        <p:style>
-          <a:lnRef idx="1">
-            <a:schemeClr val="accent1"/>
-          </a:lnRef>
-          <a:fillRef idx="0">
-            <a:schemeClr val="accent1"/>
-          </a:fillRef>
-          <a:effectRef idx="0">
-            <a:schemeClr val="accent1"/>
-          </a:effectRef>
-          <a:fontRef idx="minor">
-            <a:schemeClr val="tx1"/>
-          </a:fontRef>
-        </p:style>
-      </p:cxnSp>
-      <p:sp>
-        <p:nvSpPr>
-          <p:cNvPr id="29" name="TextBox 28">
-            <a:extLst>
-              <a:ext uri="{FF2B5EF4-FFF2-40B4-BE49-F238E27FC236}">
-                <a16:creationId xmlns:a16="http://schemas.microsoft.com/office/drawing/2014/main" id="{96D6F9B8-D587-4EA9-9D71-4C91D4C47885}"/>
-              </a:ext>
-            </a:extLst>
-          </p:cNvPr>
-          <p:cNvSpPr txBox="1"/>
-          <p:nvPr/>
-        </p:nvSpPr>
-        <p:spPr>
-          <a:xfrm>
-            <a:off x="2493645" y="1938749"/>
-            <a:ext cx="3602355" cy="646331"/>
-          </a:xfrm>
-          <a:prstGeom prst="rect">
-            <a:avLst/>
-          </a:prstGeom>
-          <a:noFill/>
-        </p:spPr>
-        <p:txBody>
-          <a:bodyPr wrap="square" rtlCol="0">
-            <a:spAutoFit/>
-          </a:bodyPr>
-          <a:lstStyle/>
-          <a:p>
-            <a:r>
-              <a:rPr lang="en-US" dirty="0"/>
-              <a:t>* Minimal Metadata</a:t>
-            </a:r>
-          </a:p>
-          <a:p>
-            <a:r>
-              <a:rPr lang="en-US" dirty="0"/>
-              <a:t>* Mapping to XDS DocumentEntry</a:t>
-            </a:r>
-          </a:p>
-        </p:txBody>
-      </p:sp>
     </p:spTree>
     <p:extLst>
       <p:ext uri="{BB962C8B-B14F-4D97-AF65-F5344CB8AC3E}">
-        <p14:creationId xmlns:p14="http://schemas.microsoft.com/office/powerpoint/2010/main" val="1578923879"/>
+        <p14:creationId xmlns:p14="http://schemas.microsoft.com/office/powerpoint/2010/main" val="1099659358"/>
       </p:ext>
     </p:extLst>
   </p:cSld>
@@ -5422,10 +5065,10 @@
       </p:grpSpPr>
       <p:sp>
         <p:nvSpPr>
-          <p:cNvPr id="5" name="Rectangle 4">
-            <a:extLst>
-              <a:ext uri="{FF2B5EF4-FFF2-40B4-BE49-F238E27FC236}">
-                <a16:creationId xmlns:a16="http://schemas.microsoft.com/office/drawing/2014/main" id="{B82C8EC1-3A34-485F-B41F-7BB4082128B9}"/>
+          <p:cNvPr id="4" name="Rectangle 3">
+            <a:extLst>
+              <a:ext uri="{FF2B5EF4-FFF2-40B4-BE49-F238E27FC236}">
+                <a16:creationId xmlns:a16="http://schemas.microsoft.com/office/drawing/2014/main" id="{7414FFF1-F365-4AC3-81EE-7FCA96F34F9C}"/>
               </a:ext>
             </a:extLst>
           </p:cNvPr>
@@ -5434,8 +5077,8 @@
         </p:nvSpPr>
         <p:spPr>
           <a:xfrm>
-            <a:off x="714102" y="483326"/>
-            <a:ext cx="10502537" cy="6135188"/>
+            <a:off x="7515497" y="4333603"/>
+            <a:ext cx="4495528" cy="731520"/>
           </a:xfrm>
           <a:prstGeom prst="rect">
             <a:avLst/>
@@ -5462,13 +5105,14 @@
           <a:bodyPr rtlCol="0" anchor="ctr"/>
           <a:lstStyle/>
           <a:p>
+            <a:pPr algn="ctr"/>
             <a:r>
               <a:rPr lang="en-US" dirty="0" err="1">
                 <a:solidFill>
                   <a:schemeClr val="tx1"/>
                 </a:solidFill>
               </a:rPr>
-              <a:t>ProvideDocumentBundle.Minimal</a:t>
+              <a:t>Query.Comprehensive.DocumentReference</a:t>
             </a:r>
             <a:endParaRPr lang="en-US" dirty="0">
               <a:solidFill>
@@ -5480,10 +5124,10 @@
       </p:sp>
       <p:sp>
         <p:nvSpPr>
-          <p:cNvPr id="7" name="Rectangle 6">
-            <a:extLst>
-              <a:ext uri="{FF2B5EF4-FFF2-40B4-BE49-F238E27FC236}">
-                <a16:creationId xmlns:a16="http://schemas.microsoft.com/office/drawing/2014/main" id="{E32C1CFE-7F94-41D9-B884-5314C366008B}"/>
+          <p:cNvPr id="5" name="Rectangle 4">
+            <a:extLst>
+              <a:ext uri="{FF2B5EF4-FFF2-40B4-BE49-F238E27FC236}">
+                <a16:creationId xmlns:a16="http://schemas.microsoft.com/office/drawing/2014/main" id="{B82C8EC1-3A34-485F-B41F-7BB4082128B9}"/>
               </a:ext>
             </a:extLst>
           </p:cNvPr>
@@ -5492,7 +5136,7 @@
         </p:nvSpPr>
         <p:spPr>
           <a:xfrm>
-            <a:off x="6566263" y="1162585"/>
+            <a:off x="248195" y="4333603"/>
             <a:ext cx="4275908" cy="731520"/>
           </a:xfrm>
           <a:prstGeom prst="rect">
@@ -5527,7 +5171,7 @@
                   <a:schemeClr val="tx1"/>
                 </a:solidFill>
               </a:rPr>
-              <a:t>Minimal.Manifest</a:t>
+              <a:t>Query.Minimal.DocumentReference</a:t>
             </a:r>
             <a:endParaRPr lang="en-US" dirty="0">
               <a:solidFill>
@@ -5539,10 +5183,10 @@
       </p:sp>
       <p:sp>
         <p:nvSpPr>
-          <p:cNvPr id="9" name="Rectangle 8">
-            <a:extLst>
-              <a:ext uri="{FF2B5EF4-FFF2-40B4-BE49-F238E27FC236}">
-                <a16:creationId xmlns:a16="http://schemas.microsoft.com/office/drawing/2014/main" id="{DBEB51D9-DC21-468C-A38F-B3677F4AFEE3}"/>
+          <p:cNvPr id="19" name="Rectangle 18">
+            <a:extLst>
+              <a:ext uri="{FF2B5EF4-FFF2-40B4-BE49-F238E27FC236}">
+                <a16:creationId xmlns:a16="http://schemas.microsoft.com/office/drawing/2014/main" id="{B8747771-B4C1-4D89-9B93-12A8ABC31D8F}"/>
               </a:ext>
             </a:extLst>
           </p:cNvPr>
@@ -5551,8 +5195,8 @@
         </p:nvSpPr>
         <p:spPr>
           <a:xfrm>
-            <a:off x="6566263" y="2225201"/>
-            <a:ext cx="4275908" cy="731520"/>
+            <a:off x="7515497" y="2748643"/>
+            <a:ext cx="4495528" cy="731520"/>
           </a:xfrm>
           <a:prstGeom prst="rect">
             <a:avLst/>
@@ -5586,7 +5230,7 @@
                   <a:schemeClr val="tx1"/>
                 </a:solidFill>
               </a:rPr>
-              <a:t>Minimal.List</a:t>
+              <a:t>Provide.Comprehensive.DocumentReference</a:t>
             </a:r>
             <a:endParaRPr lang="en-US" dirty="0">
               <a:solidFill>
@@ -5598,10 +5242,10 @@
       </p:sp>
       <p:sp>
         <p:nvSpPr>
-          <p:cNvPr id="10" name="Rectangle 9">
-            <a:extLst>
-              <a:ext uri="{FF2B5EF4-FFF2-40B4-BE49-F238E27FC236}">
-                <a16:creationId xmlns:a16="http://schemas.microsoft.com/office/drawing/2014/main" id="{BE4E0395-C48E-4075-843A-CED1C43BA65D}"/>
+          <p:cNvPr id="20" name="Rectangle 19">
+            <a:extLst>
+              <a:ext uri="{FF2B5EF4-FFF2-40B4-BE49-F238E27FC236}">
+                <a16:creationId xmlns:a16="http://schemas.microsoft.com/office/drawing/2014/main" id="{F696F8CF-D1C0-47CB-8A68-AAC82B1FE9FB}"/>
               </a:ext>
             </a:extLst>
           </p:cNvPr>
@@ -5610,7 +5254,7 @@
         </p:nvSpPr>
         <p:spPr>
           <a:xfrm>
-            <a:off x="6549493" y="3332669"/>
+            <a:off x="248195" y="2748643"/>
             <a:ext cx="4275908" cy="731520"/>
           </a:xfrm>
           <a:prstGeom prst="rect">
@@ -5645,7 +5289,7 @@
                   <a:schemeClr val="tx1"/>
                 </a:solidFill>
               </a:rPr>
-              <a:t>Minimal.DocumentReference</a:t>
+              <a:t>Provide.Minimal.DocumentReference</a:t>
             </a:r>
             <a:endParaRPr lang="en-US" dirty="0">
               <a:solidFill>
@@ -5657,10 +5301,239 @@
       </p:sp>
       <p:sp>
         <p:nvSpPr>
-          <p:cNvPr id="11" name="Rectangle 10">
-            <a:extLst>
-              <a:ext uri="{FF2B5EF4-FFF2-40B4-BE49-F238E27FC236}">
-                <a16:creationId xmlns:a16="http://schemas.microsoft.com/office/drawing/2014/main" id="{8184210A-CFF4-4A80-872B-9813A6D558E4}"/>
+          <p:cNvPr id="21" name="TextBox 20">
+            <a:extLst>
+              <a:ext uri="{FF2B5EF4-FFF2-40B4-BE49-F238E27FC236}">
+                <a16:creationId xmlns:a16="http://schemas.microsoft.com/office/drawing/2014/main" id="{47D7A85F-4761-4261-AFE3-63BDE635DC40}"/>
+              </a:ext>
+            </a:extLst>
+          </p:cNvPr>
+          <p:cNvSpPr txBox="1"/>
+          <p:nvPr/>
+        </p:nvSpPr>
+        <p:spPr>
+          <a:xfrm>
+            <a:off x="4676504" y="2990309"/>
+            <a:ext cx="2542903" cy="369332"/>
+          </a:xfrm>
+          <a:prstGeom prst="rect">
+            <a:avLst/>
+          </a:prstGeom>
+          <a:noFill/>
+        </p:spPr>
+        <p:txBody>
+          <a:bodyPr wrap="square" rtlCol="0">
+            <a:spAutoFit/>
+          </a:bodyPr>
+          <a:lstStyle/>
+          <a:p>
+            <a:r>
+              <a:rPr lang="en-US" dirty="0"/>
+              <a:t>+ XDS required elements</a:t>
+            </a:r>
+          </a:p>
+        </p:txBody>
+      </p:sp>
+      <p:cxnSp>
+        <p:nvCxnSpPr>
+          <p:cNvPr id="22" name="Straight Arrow Connector 21">
+            <a:extLst>
+              <a:ext uri="{FF2B5EF4-FFF2-40B4-BE49-F238E27FC236}">
+                <a16:creationId xmlns:a16="http://schemas.microsoft.com/office/drawing/2014/main" id="{EDABF35E-3560-437C-9E53-A393D3FB56C2}"/>
+              </a:ext>
+            </a:extLst>
+          </p:cNvPr>
+          <p:cNvCxnSpPr/>
+          <p:nvPr/>
+        </p:nvCxnSpPr>
+        <p:spPr>
+          <a:xfrm>
+            <a:off x="4524103" y="2976311"/>
+            <a:ext cx="2991394" cy="0"/>
+          </a:xfrm>
+          <a:prstGeom prst="straightConnector1">
+            <a:avLst/>
+          </a:prstGeom>
+          <a:ln w="31750">
+            <a:tailEnd type="triangle" w="lg" len="lg"/>
+          </a:ln>
+        </p:spPr>
+        <p:style>
+          <a:lnRef idx="1">
+            <a:schemeClr val="accent1"/>
+          </a:lnRef>
+          <a:fillRef idx="0">
+            <a:schemeClr val="accent1"/>
+          </a:fillRef>
+          <a:effectRef idx="0">
+            <a:schemeClr val="accent1"/>
+          </a:effectRef>
+          <a:fontRef idx="minor">
+            <a:schemeClr val="tx1"/>
+          </a:fontRef>
+        </p:style>
+      </p:cxnSp>
+      <p:cxnSp>
+        <p:nvCxnSpPr>
+          <p:cNvPr id="23" name="Straight Arrow Connector 22">
+            <a:extLst>
+              <a:ext uri="{FF2B5EF4-FFF2-40B4-BE49-F238E27FC236}">
+                <a16:creationId xmlns:a16="http://schemas.microsoft.com/office/drawing/2014/main" id="{C163C91F-D1C6-44C6-8D1B-BC256B5E432F}"/>
+              </a:ext>
+            </a:extLst>
+          </p:cNvPr>
+          <p:cNvCxnSpPr>
+            <a:cxnSpLocks/>
+            <a:stCxn id="20" idx="2"/>
+            <a:endCxn id="5" idx="0"/>
+          </p:cNvCxnSpPr>
+          <p:nvPr/>
+        </p:nvCxnSpPr>
+        <p:spPr>
+          <a:xfrm>
+            <a:off x="2386149" y="3480163"/>
+            <a:ext cx="0" cy="853440"/>
+          </a:xfrm>
+          <a:prstGeom prst="straightConnector1">
+            <a:avLst/>
+          </a:prstGeom>
+          <a:ln w="31750">
+            <a:tailEnd type="triangle" w="lg" len="lg"/>
+          </a:ln>
+        </p:spPr>
+        <p:style>
+          <a:lnRef idx="1">
+            <a:schemeClr val="accent1"/>
+          </a:lnRef>
+          <a:fillRef idx="0">
+            <a:schemeClr val="accent1"/>
+          </a:fillRef>
+          <a:effectRef idx="0">
+            <a:schemeClr val="accent1"/>
+          </a:effectRef>
+          <a:fontRef idx="minor">
+            <a:schemeClr val="tx1"/>
+          </a:fontRef>
+        </p:style>
+      </p:cxnSp>
+      <p:sp>
+        <p:nvSpPr>
+          <p:cNvPr id="26" name="TextBox 25">
+            <a:extLst>
+              <a:ext uri="{FF2B5EF4-FFF2-40B4-BE49-F238E27FC236}">
+                <a16:creationId xmlns:a16="http://schemas.microsoft.com/office/drawing/2014/main" id="{ACC0A076-9F8A-4B49-84F8-CF842E01BFD3}"/>
+              </a:ext>
+            </a:extLst>
+          </p:cNvPr>
+          <p:cNvSpPr txBox="1"/>
+          <p:nvPr/>
+        </p:nvSpPr>
+        <p:spPr>
+          <a:xfrm>
+            <a:off x="2407920" y="3772607"/>
+            <a:ext cx="2542903" cy="369332"/>
+          </a:xfrm>
+          <a:prstGeom prst="rect">
+            <a:avLst/>
+          </a:prstGeom>
+          <a:noFill/>
+        </p:spPr>
+        <p:txBody>
+          <a:bodyPr wrap="square" rtlCol="0">
+            <a:spAutoFit/>
+          </a:bodyPr>
+          <a:lstStyle/>
+          <a:p>
+            <a:r>
+              <a:rPr lang="en-US" dirty="0"/>
+              <a:t>+ Identifier</a:t>
+            </a:r>
+          </a:p>
+        </p:txBody>
+      </p:sp>
+      <p:cxnSp>
+        <p:nvCxnSpPr>
+          <p:cNvPr id="27" name="Straight Arrow Connector 26">
+            <a:extLst>
+              <a:ext uri="{FF2B5EF4-FFF2-40B4-BE49-F238E27FC236}">
+                <a16:creationId xmlns:a16="http://schemas.microsoft.com/office/drawing/2014/main" id="{809642C2-138F-4120-9174-59D5D53E5CF1}"/>
+              </a:ext>
+            </a:extLst>
+          </p:cNvPr>
+          <p:cNvCxnSpPr>
+            <a:cxnSpLocks/>
+            <a:stCxn id="19" idx="2"/>
+          </p:cNvCxnSpPr>
+          <p:nvPr/>
+        </p:nvCxnSpPr>
+        <p:spPr>
+          <a:xfrm flipH="1">
+            <a:off x="9762309" y="3480163"/>
+            <a:ext cx="952" cy="855679"/>
+          </a:xfrm>
+          <a:prstGeom prst="straightConnector1">
+            <a:avLst/>
+          </a:prstGeom>
+          <a:ln w="31750">
+            <a:tailEnd type="triangle" w="lg" len="lg"/>
+          </a:ln>
+        </p:spPr>
+        <p:style>
+          <a:lnRef idx="1">
+            <a:schemeClr val="accent1"/>
+          </a:lnRef>
+          <a:fillRef idx="0">
+            <a:schemeClr val="accent1"/>
+          </a:fillRef>
+          <a:effectRef idx="0">
+            <a:schemeClr val="accent1"/>
+          </a:effectRef>
+          <a:fontRef idx="minor">
+            <a:schemeClr val="tx1"/>
+          </a:fontRef>
+        </p:style>
+      </p:cxnSp>
+      <p:sp>
+        <p:nvSpPr>
+          <p:cNvPr id="28" name="TextBox 27">
+            <a:extLst>
+              <a:ext uri="{FF2B5EF4-FFF2-40B4-BE49-F238E27FC236}">
+                <a16:creationId xmlns:a16="http://schemas.microsoft.com/office/drawing/2014/main" id="{53E14C99-35D7-4BB4-A0D2-DAE1885A53CD}"/>
+              </a:ext>
+            </a:extLst>
+          </p:cNvPr>
+          <p:cNvSpPr txBox="1"/>
+          <p:nvPr/>
+        </p:nvSpPr>
+        <p:spPr>
+          <a:xfrm>
+            <a:off x="9784080" y="3774846"/>
+            <a:ext cx="2542903" cy="369332"/>
+          </a:xfrm>
+          <a:prstGeom prst="rect">
+            <a:avLst/>
+          </a:prstGeom>
+          <a:noFill/>
+        </p:spPr>
+        <p:txBody>
+          <a:bodyPr wrap="square" rtlCol="0">
+            <a:spAutoFit/>
+          </a:bodyPr>
+          <a:lstStyle/>
+          <a:p>
+            <a:r>
+              <a:rPr lang="en-US" dirty="0"/>
+              <a:t>+ Identifier</a:t>
+            </a:r>
+          </a:p>
+        </p:txBody>
+      </p:sp>
+      <p:sp>
+        <p:nvSpPr>
+          <p:cNvPr id="24" name="Rectangle 23">
+            <a:extLst>
+              <a:ext uri="{FF2B5EF4-FFF2-40B4-BE49-F238E27FC236}">
+                <a16:creationId xmlns:a16="http://schemas.microsoft.com/office/drawing/2014/main" id="{C00F57E2-7EAB-4C73-A4C0-A3920E06366B}"/>
               </a:ext>
             </a:extLst>
           </p:cNvPr>
@@ -5669,7 +5542,7 @@
         </p:nvSpPr>
         <p:spPr>
           <a:xfrm>
-            <a:off x="6566263" y="4384756"/>
+            <a:off x="248195" y="1043668"/>
             <a:ext cx="4275908" cy="731520"/>
           </a:xfrm>
           <a:prstGeom prst="rect">
@@ -5699,265 +5572,43 @@
           <a:p>
             <a:pPr algn="ctr"/>
             <a:r>
-              <a:rPr lang="en-US" dirty="0">
+              <a:rPr lang="en-US" i="1" dirty="0">
                 <a:solidFill>
                   <a:schemeClr val="tx1"/>
                 </a:solidFill>
               </a:rPr>
-              <a:t>Binary</a:t>
-            </a:r>
-          </a:p>
-        </p:txBody>
-      </p:sp>
-      <p:sp>
-        <p:nvSpPr>
-          <p:cNvPr id="12" name="Rectangle 11">
-            <a:extLst>
-              <a:ext uri="{FF2B5EF4-FFF2-40B4-BE49-F238E27FC236}">
-                <a16:creationId xmlns:a16="http://schemas.microsoft.com/office/drawing/2014/main" id="{540AD772-9F7E-4586-A2F6-B6B6D1A28DD9}"/>
-              </a:ext>
-            </a:extLst>
-          </p:cNvPr>
-          <p:cNvSpPr/>
-          <p:nvPr/>
-        </p:nvSpPr>
-        <p:spPr>
-          <a:xfrm>
-            <a:off x="6566263" y="5312219"/>
-            <a:ext cx="4275908" cy="731520"/>
-          </a:xfrm>
-          <a:prstGeom prst="rect">
-            <a:avLst/>
-          </a:prstGeom>
-          <a:noFill/>
-        </p:spPr>
-        <p:style>
-          <a:lnRef idx="2">
-            <a:schemeClr val="accent1">
-              <a:shade val="50000"/>
-            </a:schemeClr>
-          </a:lnRef>
-          <a:fillRef idx="1">
-            <a:schemeClr val="accent1"/>
-          </a:fillRef>
-          <a:effectRef idx="0">
-            <a:schemeClr val="accent1"/>
-          </a:effectRef>
-          <a:fontRef idx="minor">
-            <a:schemeClr val="lt1"/>
-          </a:fontRef>
-        </p:style>
-        <p:txBody>
-          <a:bodyPr rtlCol="0" anchor="ctr"/>
-          <a:lstStyle/>
-          <a:p>
-            <a:pPr algn="ctr"/>
-            <a:r>
-              <a:rPr lang="en-US" dirty="0">
-                <a:solidFill>
-                  <a:schemeClr val="tx1"/>
-                </a:solidFill>
-              </a:rPr>
-              <a:t>Patient</a:t>
-            </a:r>
-          </a:p>
-        </p:txBody>
-      </p:sp>
-      <p:sp>
-        <p:nvSpPr>
-          <p:cNvPr id="2" name="TextBox 1">
-            <a:extLst>
-              <a:ext uri="{FF2B5EF4-FFF2-40B4-BE49-F238E27FC236}">
-                <a16:creationId xmlns:a16="http://schemas.microsoft.com/office/drawing/2014/main" id="{BFD66137-DD88-4900-830C-22F17CD1B501}"/>
-              </a:ext>
-            </a:extLst>
-          </p:cNvPr>
-          <p:cNvSpPr txBox="1"/>
-          <p:nvPr/>
-        </p:nvSpPr>
-        <p:spPr>
-          <a:xfrm>
-            <a:off x="5625738" y="1358528"/>
-            <a:ext cx="534121" cy="369332"/>
-          </a:xfrm>
-          <a:prstGeom prst="rect">
-            <a:avLst/>
-          </a:prstGeom>
-          <a:noFill/>
-        </p:spPr>
-        <p:txBody>
-          <a:bodyPr wrap="none" rtlCol="0">
-            <a:spAutoFit/>
-          </a:bodyPr>
-          <a:lstStyle/>
-          <a:p>
-            <a:r>
-              <a:rPr lang="en-US" dirty="0"/>
-              <a:t>1..1</a:t>
-            </a:r>
-          </a:p>
-        </p:txBody>
-      </p:sp>
-      <p:sp>
-        <p:nvSpPr>
-          <p:cNvPr id="13" name="TextBox 12">
-            <a:extLst>
-              <a:ext uri="{FF2B5EF4-FFF2-40B4-BE49-F238E27FC236}">
-                <a16:creationId xmlns:a16="http://schemas.microsoft.com/office/drawing/2014/main" id="{06C9A42A-5374-45E2-9194-087640094FEC}"/>
-              </a:ext>
-            </a:extLst>
-          </p:cNvPr>
-          <p:cNvSpPr txBox="1"/>
-          <p:nvPr/>
-        </p:nvSpPr>
-        <p:spPr>
-          <a:xfrm>
-            <a:off x="5625737" y="2294699"/>
-            <a:ext cx="532518" cy="369332"/>
-          </a:xfrm>
-          <a:prstGeom prst="rect">
-            <a:avLst/>
-          </a:prstGeom>
-          <a:noFill/>
-        </p:spPr>
-        <p:txBody>
-          <a:bodyPr wrap="none" rtlCol="0">
-            <a:spAutoFit/>
-          </a:bodyPr>
-          <a:lstStyle/>
-          <a:p>
-            <a:r>
-              <a:rPr lang="en-US" dirty="0"/>
-              <a:t>0..*</a:t>
-            </a:r>
-          </a:p>
-        </p:txBody>
-      </p:sp>
-      <p:sp>
-        <p:nvSpPr>
-          <p:cNvPr id="14" name="TextBox 13">
-            <a:extLst>
-              <a:ext uri="{FF2B5EF4-FFF2-40B4-BE49-F238E27FC236}">
-                <a16:creationId xmlns:a16="http://schemas.microsoft.com/office/drawing/2014/main" id="{0C8D33D8-7B83-492C-A325-D6C32AD358E1}"/>
-              </a:ext>
-            </a:extLst>
-          </p:cNvPr>
-          <p:cNvSpPr txBox="1"/>
-          <p:nvPr/>
-        </p:nvSpPr>
-        <p:spPr>
-          <a:xfrm>
-            <a:off x="5625737" y="3441442"/>
-            <a:ext cx="532518" cy="369332"/>
-          </a:xfrm>
-          <a:prstGeom prst="rect">
-            <a:avLst/>
-          </a:prstGeom>
-          <a:noFill/>
-        </p:spPr>
-        <p:txBody>
-          <a:bodyPr wrap="none" rtlCol="0">
-            <a:spAutoFit/>
-          </a:bodyPr>
-          <a:lstStyle/>
-          <a:p>
-            <a:r>
-              <a:rPr lang="en-US" dirty="0"/>
-              <a:t>0..*</a:t>
-            </a:r>
-          </a:p>
-        </p:txBody>
-      </p:sp>
-      <p:sp>
-        <p:nvSpPr>
-          <p:cNvPr id="15" name="TextBox 14">
-            <a:extLst>
-              <a:ext uri="{FF2B5EF4-FFF2-40B4-BE49-F238E27FC236}">
-                <a16:creationId xmlns:a16="http://schemas.microsoft.com/office/drawing/2014/main" id="{E1B457EF-F123-4168-AE29-5192DC7B7CB2}"/>
-              </a:ext>
-            </a:extLst>
-          </p:cNvPr>
-          <p:cNvSpPr txBox="1"/>
-          <p:nvPr/>
-        </p:nvSpPr>
-        <p:spPr>
-          <a:xfrm>
-            <a:off x="5625737" y="4482336"/>
-            <a:ext cx="532518" cy="369332"/>
-          </a:xfrm>
-          <a:prstGeom prst="rect">
-            <a:avLst/>
-          </a:prstGeom>
-          <a:noFill/>
-        </p:spPr>
-        <p:txBody>
-          <a:bodyPr wrap="none" rtlCol="0">
-            <a:spAutoFit/>
-          </a:bodyPr>
-          <a:lstStyle/>
-          <a:p>
-            <a:r>
-              <a:rPr lang="en-US" dirty="0"/>
-              <a:t>0..*</a:t>
-            </a:r>
-          </a:p>
-        </p:txBody>
-      </p:sp>
-      <p:sp>
-        <p:nvSpPr>
-          <p:cNvPr id="16" name="TextBox 15">
-            <a:extLst>
-              <a:ext uri="{FF2B5EF4-FFF2-40B4-BE49-F238E27FC236}">
-                <a16:creationId xmlns:a16="http://schemas.microsoft.com/office/drawing/2014/main" id="{97D3A049-6790-4921-ACA9-5E217F2CAE0C}"/>
-              </a:ext>
-            </a:extLst>
-          </p:cNvPr>
-          <p:cNvSpPr txBox="1"/>
-          <p:nvPr/>
-        </p:nvSpPr>
-        <p:spPr>
-          <a:xfrm>
-            <a:off x="5630739" y="5452058"/>
-            <a:ext cx="534121" cy="369332"/>
-          </a:xfrm>
-          <a:prstGeom prst="rect">
-            <a:avLst/>
-          </a:prstGeom>
-          <a:noFill/>
-        </p:spPr>
-        <p:txBody>
-          <a:bodyPr wrap="none" rtlCol="0">
-            <a:spAutoFit/>
-          </a:bodyPr>
-          <a:lstStyle/>
-          <a:p>
-            <a:r>
-              <a:rPr lang="en-US" dirty="0"/>
-              <a:t>0..1</a:t>
-            </a:r>
-          </a:p>
-        </p:txBody>
-      </p:sp>
-      <p:sp>
-        <p:nvSpPr>
-          <p:cNvPr id="3" name="Left Brace 2">
-            <a:extLst>
-              <a:ext uri="{FF2B5EF4-FFF2-40B4-BE49-F238E27FC236}">
-                <a16:creationId xmlns:a16="http://schemas.microsoft.com/office/drawing/2014/main" id="{900A3034-B647-45F7-A937-2DD7503EE9BF}"/>
-              </a:ext>
-            </a:extLst>
-          </p:cNvPr>
-          <p:cNvSpPr/>
-          <p:nvPr/>
-        </p:nvSpPr>
-        <p:spPr>
-          <a:xfrm>
-            <a:off x="4675414" y="1162586"/>
-            <a:ext cx="532518" cy="4881154"/>
-          </a:xfrm>
-          <a:prstGeom prst="leftBrace">
-            <a:avLst/>
-          </a:prstGeom>
+              <a:t>FHIR core DocumentReference</a:t>
+            </a:r>
+          </a:p>
+        </p:txBody>
+      </p:sp>
+      <p:cxnSp>
+        <p:nvCxnSpPr>
+          <p:cNvPr id="25" name="Straight Arrow Connector 24">
+            <a:extLst>
+              <a:ext uri="{FF2B5EF4-FFF2-40B4-BE49-F238E27FC236}">
+                <a16:creationId xmlns:a16="http://schemas.microsoft.com/office/drawing/2014/main" id="{6FCF5A7E-6107-4D1F-B8FC-D952AED26AF8}"/>
+              </a:ext>
+            </a:extLst>
+          </p:cNvPr>
+          <p:cNvCxnSpPr>
+            <a:cxnSpLocks/>
+            <a:stCxn id="24" idx="2"/>
+            <a:endCxn id="20" idx="0"/>
+          </p:cNvCxnSpPr>
+          <p:nvPr/>
+        </p:nvCxnSpPr>
+        <p:spPr>
+          <a:xfrm>
+            <a:off x="2386149" y="1775188"/>
+            <a:ext cx="0" cy="973455"/>
+          </a:xfrm>
+          <a:prstGeom prst="straightConnector1">
+            <a:avLst/>
+          </a:prstGeom>
+          <a:ln w="31750">
+            <a:tailEnd type="triangle" w="lg" len="lg"/>
+          </a:ln>
         </p:spPr>
         <p:style>
           <a:lnRef idx="1">
@@ -5973,19 +5624,52 @@
             <a:schemeClr val="tx1"/>
           </a:fontRef>
         </p:style>
-        <p:txBody>
-          <a:bodyPr rtlCol="0" anchor="ctr"/>
-          <a:lstStyle/>
-          <a:p>
-            <a:pPr algn="ctr"/>
-            <a:endParaRPr lang="en-US"/>
+      </p:cxnSp>
+      <p:sp>
+        <p:nvSpPr>
+          <p:cNvPr id="29" name="TextBox 28">
+            <a:extLst>
+              <a:ext uri="{FF2B5EF4-FFF2-40B4-BE49-F238E27FC236}">
+                <a16:creationId xmlns:a16="http://schemas.microsoft.com/office/drawing/2014/main" id="{96D6F9B8-D587-4EA9-9D71-4C91D4C47885}"/>
+              </a:ext>
+            </a:extLst>
+          </p:cNvPr>
+          <p:cNvSpPr txBox="1"/>
+          <p:nvPr/>
+        </p:nvSpPr>
+        <p:spPr>
+          <a:xfrm>
+            <a:off x="2493645" y="1938749"/>
+            <a:ext cx="3602355" cy="646331"/>
+          </a:xfrm>
+          <a:prstGeom prst="rect">
+            <a:avLst/>
+          </a:prstGeom>
+          <a:noFill/>
+        </p:spPr>
+        <p:txBody>
+          <a:bodyPr wrap="square" rtlCol="0">
+            <a:spAutoFit/>
+          </a:bodyPr>
+          <a:lstStyle/>
+          <a:p>
+            <a:r>
+              <a:rPr lang="en-US" dirty="0"/>
+              <a:t>* Minimal Metadata</a:t>
+            </a:r>
+          </a:p>
+          <a:p>
+            <a:r>
+              <a:rPr lang="en-US" dirty="0"/>
+              <a:t>* Mapping to XDS DocumentEntry</a:t>
+            </a:r>
           </a:p>
         </p:txBody>
       </p:sp>
     </p:spTree>
     <p:extLst>
       <p:ext uri="{BB962C8B-B14F-4D97-AF65-F5344CB8AC3E}">
-        <p14:creationId xmlns:p14="http://schemas.microsoft.com/office/powerpoint/2010/main" val="2484407674"/>
+        <p14:creationId xmlns:p14="http://schemas.microsoft.com/office/powerpoint/2010/main" val="1578923879"/>
       </p:ext>
     </p:extLst>
   </p:cSld>
@@ -6060,6 +5744,598 @@
                   <a:schemeClr val="tx1"/>
                 </a:solidFill>
               </a:rPr>
+              <a:t>ProvideDocumentBundle.Minimal</a:t>
+            </a:r>
+            <a:endParaRPr lang="en-US" dirty="0">
+              <a:solidFill>
+                <a:schemeClr val="tx1"/>
+              </a:solidFill>
+            </a:endParaRPr>
+          </a:p>
+        </p:txBody>
+      </p:sp>
+      <p:sp>
+        <p:nvSpPr>
+          <p:cNvPr id="7" name="Rectangle 6">
+            <a:extLst>
+              <a:ext uri="{FF2B5EF4-FFF2-40B4-BE49-F238E27FC236}">
+                <a16:creationId xmlns:a16="http://schemas.microsoft.com/office/drawing/2014/main" id="{E32C1CFE-7F94-41D9-B884-5314C366008B}"/>
+              </a:ext>
+            </a:extLst>
+          </p:cNvPr>
+          <p:cNvSpPr/>
+          <p:nvPr/>
+        </p:nvSpPr>
+        <p:spPr>
+          <a:xfrm>
+            <a:off x="6566263" y="1162585"/>
+            <a:ext cx="4275908" cy="731520"/>
+          </a:xfrm>
+          <a:prstGeom prst="rect">
+            <a:avLst/>
+          </a:prstGeom>
+          <a:noFill/>
+        </p:spPr>
+        <p:style>
+          <a:lnRef idx="2">
+            <a:schemeClr val="accent1">
+              <a:shade val="50000"/>
+            </a:schemeClr>
+          </a:lnRef>
+          <a:fillRef idx="1">
+            <a:schemeClr val="accent1"/>
+          </a:fillRef>
+          <a:effectRef idx="0">
+            <a:schemeClr val="accent1"/>
+          </a:effectRef>
+          <a:fontRef idx="minor">
+            <a:schemeClr val="lt1"/>
+          </a:fontRef>
+        </p:style>
+        <p:txBody>
+          <a:bodyPr rtlCol="0" anchor="ctr"/>
+          <a:lstStyle/>
+          <a:p>
+            <a:pPr algn="ctr"/>
+            <a:r>
+              <a:rPr lang="en-US" dirty="0" err="1">
+                <a:solidFill>
+                  <a:schemeClr val="tx1"/>
+                </a:solidFill>
+              </a:rPr>
+              <a:t>Minimal.Manifest</a:t>
+            </a:r>
+            <a:endParaRPr lang="en-US" dirty="0">
+              <a:solidFill>
+                <a:schemeClr val="tx1"/>
+              </a:solidFill>
+            </a:endParaRPr>
+          </a:p>
+        </p:txBody>
+      </p:sp>
+      <p:sp>
+        <p:nvSpPr>
+          <p:cNvPr id="9" name="Rectangle 8">
+            <a:extLst>
+              <a:ext uri="{FF2B5EF4-FFF2-40B4-BE49-F238E27FC236}">
+                <a16:creationId xmlns:a16="http://schemas.microsoft.com/office/drawing/2014/main" id="{DBEB51D9-DC21-468C-A38F-B3677F4AFEE3}"/>
+              </a:ext>
+            </a:extLst>
+          </p:cNvPr>
+          <p:cNvSpPr/>
+          <p:nvPr/>
+        </p:nvSpPr>
+        <p:spPr>
+          <a:xfrm>
+            <a:off x="6566263" y="2225201"/>
+            <a:ext cx="4275908" cy="731520"/>
+          </a:xfrm>
+          <a:prstGeom prst="rect">
+            <a:avLst/>
+          </a:prstGeom>
+          <a:noFill/>
+        </p:spPr>
+        <p:style>
+          <a:lnRef idx="2">
+            <a:schemeClr val="accent1">
+              <a:shade val="50000"/>
+            </a:schemeClr>
+          </a:lnRef>
+          <a:fillRef idx="1">
+            <a:schemeClr val="accent1"/>
+          </a:fillRef>
+          <a:effectRef idx="0">
+            <a:schemeClr val="accent1"/>
+          </a:effectRef>
+          <a:fontRef idx="minor">
+            <a:schemeClr val="lt1"/>
+          </a:fontRef>
+        </p:style>
+        <p:txBody>
+          <a:bodyPr rtlCol="0" anchor="ctr"/>
+          <a:lstStyle/>
+          <a:p>
+            <a:pPr algn="ctr"/>
+            <a:r>
+              <a:rPr lang="en-US" dirty="0" err="1">
+                <a:solidFill>
+                  <a:schemeClr val="tx1"/>
+                </a:solidFill>
+              </a:rPr>
+              <a:t>Minimal.List</a:t>
+            </a:r>
+            <a:endParaRPr lang="en-US" dirty="0">
+              <a:solidFill>
+                <a:schemeClr val="tx1"/>
+              </a:solidFill>
+            </a:endParaRPr>
+          </a:p>
+        </p:txBody>
+      </p:sp>
+      <p:sp>
+        <p:nvSpPr>
+          <p:cNvPr id="10" name="Rectangle 9">
+            <a:extLst>
+              <a:ext uri="{FF2B5EF4-FFF2-40B4-BE49-F238E27FC236}">
+                <a16:creationId xmlns:a16="http://schemas.microsoft.com/office/drawing/2014/main" id="{BE4E0395-C48E-4075-843A-CED1C43BA65D}"/>
+              </a:ext>
+            </a:extLst>
+          </p:cNvPr>
+          <p:cNvSpPr/>
+          <p:nvPr/>
+        </p:nvSpPr>
+        <p:spPr>
+          <a:xfrm>
+            <a:off x="6549493" y="3332669"/>
+            <a:ext cx="4275908" cy="731520"/>
+          </a:xfrm>
+          <a:prstGeom prst="rect">
+            <a:avLst/>
+          </a:prstGeom>
+          <a:noFill/>
+        </p:spPr>
+        <p:style>
+          <a:lnRef idx="2">
+            <a:schemeClr val="accent1">
+              <a:shade val="50000"/>
+            </a:schemeClr>
+          </a:lnRef>
+          <a:fillRef idx="1">
+            <a:schemeClr val="accent1"/>
+          </a:fillRef>
+          <a:effectRef idx="0">
+            <a:schemeClr val="accent1"/>
+          </a:effectRef>
+          <a:fontRef idx="minor">
+            <a:schemeClr val="lt1"/>
+          </a:fontRef>
+        </p:style>
+        <p:txBody>
+          <a:bodyPr rtlCol="0" anchor="ctr"/>
+          <a:lstStyle/>
+          <a:p>
+            <a:pPr algn="ctr"/>
+            <a:r>
+              <a:rPr lang="en-US" dirty="0" err="1">
+                <a:solidFill>
+                  <a:schemeClr val="tx1"/>
+                </a:solidFill>
+              </a:rPr>
+              <a:t>Minimal.DocumentReference</a:t>
+            </a:r>
+            <a:endParaRPr lang="en-US" dirty="0">
+              <a:solidFill>
+                <a:schemeClr val="tx1"/>
+              </a:solidFill>
+            </a:endParaRPr>
+          </a:p>
+        </p:txBody>
+      </p:sp>
+      <p:sp>
+        <p:nvSpPr>
+          <p:cNvPr id="11" name="Rectangle 10">
+            <a:extLst>
+              <a:ext uri="{FF2B5EF4-FFF2-40B4-BE49-F238E27FC236}">
+                <a16:creationId xmlns:a16="http://schemas.microsoft.com/office/drawing/2014/main" id="{8184210A-CFF4-4A80-872B-9813A6D558E4}"/>
+              </a:ext>
+            </a:extLst>
+          </p:cNvPr>
+          <p:cNvSpPr/>
+          <p:nvPr/>
+        </p:nvSpPr>
+        <p:spPr>
+          <a:xfrm>
+            <a:off x="6566263" y="4384756"/>
+            <a:ext cx="4275908" cy="731520"/>
+          </a:xfrm>
+          <a:prstGeom prst="rect">
+            <a:avLst/>
+          </a:prstGeom>
+          <a:noFill/>
+        </p:spPr>
+        <p:style>
+          <a:lnRef idx="2">
+            <a:schemeClr val="accent1">
+              <a:shade val="50000"/>
+            </a:schemeClr>
+          </a:lnRef>
+          <a:fillRef idx="1">
+            <a:schemeClr val="accent1"/>
+          </a:fillRef>
+          <a:effectRef idx="0">
+            <a:schemeClr val="accent1"/>
+          </a:effectRef>
+          <a:fontRef idx="minor">
+            <a:schemeClr val="lt1"/>
+          </a:fontRef>
+        </p:style>
+        <p:txBody>
+          <a:bodyPr rtlCol="0" anchor="ctr"/>
+          <a:lstStyle/>
+          <a:p>
+            <a:pPr algn="ctr"/>
+            <a:r>
+              <a:rPr lang="en-US" dirty="0">
+                <a:solidFill>
+                  <a:schemeClr val="tx1"/>
+                </a:solidFill>
+              </a:rPr>
+              <a:t>Binary</a:t>
+            </a:r>
+          </a:p>
+        </p:txBody>
+      </p:sp>
+      <p:sp>
+        <p:nvSpPr>
+          <p:cNvPr id="12" name="Rectangle 11">
+            <a:extLst>
+              <a:ext uri="{FF2B5EF4-FFF2-40B4-BE49-F238E27FC236}">
+                <a16:creationId xmlns:a16="http://schemas.microsoft.com/office/drawing/2014/main" id="{540AD772-9F7E-4586-A2F6-B6B6D1A28DD9}"/>
+              </a:ext>
+            </a:extLst>
+          </p:cNvPr>
+          <p:cNvSpPr/>
+          <p:nvPr/>
+        </p:nvSpPr>
+        <p:spPr>
+          <a:xfrm>
+            <a:off x="6566263" y="5312219"/>
+            <a:ext cx="4275908" cy="731520"/>
+          </a:xfrm>
+          <a:prstGeom prst="rect">
+            <a:avLst/>
+          </a:prstGeom>
+          <a:noFill/>
+        </p:spPr>
+        <p:style>
+          <a:lnRef idx="2">
+            <a:schemeClr val="accent1">
+              <a:shade val="50000"/>
+            </a:schemeClr>
+          </a:lnRef>
+          <a:fillRef idx="1">
+            <a:schemeClr val="accent1"/>
+          </a:fillRef>
+          <a:effectRef idx="0">
+            <a:schemeClr val="accent1"/>
+          </a:effectRef>
+          <a:fontRef idx="minor">
+            <a:schemeClr val="lt1"/>
+          </a:fontRef>
+        </p:style>
+        <p:txBody>
+          <a:bodyPr rtlCol="0" anchor="ctr"/>
+          <a:lstStyle/>
+          <a:p>
+            <a:pPr algn="ctr"/>
+            <a:r>
+              <a:rPr lang="en-US" dirty="0">
+                <a:solidFill>
+                  <a:schemeClr val="tx1"/>
+                </a:solidFill>
+              </a:rPr>
+              <a:t>Patient</a:t>
+            </a:r>
+          </a:p>
+        </p:txBody>
+      </p:sp>
+      <p:sp>
+        <p:nvSpPr>
+          <p:cNvPr id="2" name="TextBox 1">
+            <a:extLst>
+              <a:ext uri="{FF2B5EF4-FFF2-40B4-BE49-F238E27FC236}">
+                <a16:creationId xmlns:a16="http://schemas.microsoft.com/office/drawing/2014/main" id="{BFD66137-DD88-4900-830C-22F17CD1B501}"/>
+              </a:ext>
+            </a:extLst>
+          </p:cNvPr>
+          <p:cNvSpPr txBox="1"/>
+          <p:nvPr/>
+        </p:nvSpPr>
+        <p:spPr>
+          <a:xfrm>
+            <a:off x="5625738" y="1358528"/>
+            <a:ext cx="534121" cy="369332"/>
+          </a:xfrm>
+          <a:prstGeom prst="rect">
+            <a:avLst/>
+          </a:prstGeom>
+          <a:noFill/>
+        </p:spPr>
+        <p:txBody>
+          <a:bodyPr wrap="none" rtlCol="0">
+            <a:spAutoFit/>
+          </a:bodyPr>
+          <a:lstStyle/>
+          <a:p>
+            <a:r>
+              <a:rPr lang="en-US" dirty="0"/>
+              <a:t>1..1</a:t>
+            </a:r>
+          </a:p>
+        </p:txBody>
+      </p:sp>
+      <p:sp>
+        <p:nvSpPr>
+          <p:cNvPr id="13" name="TextBox 12">
+            <a:extLst>
+              <a:ext uri="{FF2B5EF4-FFF2-40B4-BE49-F238E27FC236}">
+                <a16:creationId xmlns:a16="http://schemas.microsoft.com/office/drawing/2014/main" id="{06C9A42A-5374-45E2-9194-087640094FEC}"/>
+              </a:ext>
+            </a:extLst>
+          </p:cNvPr>
+          <p:cNvSpPr txBox="1"/>
+          <p:nvPr/>
+        </p:nvSpPr>
+        <p:spPr>
+          <a:xfrm>
+            <a:off x="5625737" y="2294699"/>
+            <a:ext cx="532518" cy="369332"/>
+          </a:xfrm>
+          <a:prstGeom prst="rect">
+            <a:avLst/>
+          </a:prstGeom>
+          <a:noFill/>
+        </p:spPr>
+        <p:txBody>
+          <a:bodyPr wrap="none" rtlCol="0">
+            <a:spAutoFit/>
+          </a:bodyPr>
+          <a:lstStyle/>
+          <a:p>
+            <a:r>
+              <a:rPr lang="en-US" dirty="0"/>
+              <a:t>0..*</a:t>
+            </a:r>
+          </a:p>
+        </p:txBody>
+      </p:sp>
+      <p:sp>
+        <p:nvSpPr>
+          <p:cNvPr id="14" name="TextBox 13">
+            <a:extLst>
+              <a:ext uri="{FF2B5EF4-FFF2-40B4-BE49-F238E27FC236}">
+                <a16:creationId xmlns:a16="http://schemas.microsoft.com/office/drawing/2014/main" id="{0C8D33D8-7B83-492C-A325-D6C32AD358E1}"/>
+              </a:ext>
+            </a:extLst>
+          </p:cNvPr>
+          <p:cNvSpPr txBox="1"/>
+          <p:nvPr/>
+        </p:nvSpPr>
+        <p:spPr>
+          <a:xfrm>
+            <a:off x="5625737" y="3441442"/>
+            <a:ext cx="532518" cy="369332"/>
+          </a:xfrm>
+          <a:prstGeom prst="rect">
+            <a:avLst/>
+          </a:prstGeom>
+          <a:noFill/>
+        </p:spPr>
+        <p:txBody>
+          <a:bodyPr wrap="none" rtlCol="0">
+            <a:spAutoFit/>
+          </a:bodyPr>
+          <a:lstStyle/>
+          <a:p>
+            <a:r>
+              <a:rPr lang="en-US" dirty="0"/>
+              <a:t>0..*</a:t>
+            </a:r>
+          </a:p>
+        </p:txBody>
+      </p:sp>
+      <p:sp>
+        <p:nvSpPr>
+          <p:cNvPr id="15" name="TextBox 14">
+            <a:extLst>
+              <a:ext uri="{FF2B5EF4-FFF2-40B4-BE49-F238E27FC236}">
+                <a16:creationId xmlns:a16="http://schemas.microsoft.com/office/drawing/2014/main" id="{E1B457EF-F123-4168-AE29-5192DC7B7CB2}"/>
+              </a:ext>
+            </a:extLst>
+          </p:cNvPr>
+          <p:cNvSpPr txBox="1"/>
+          <p:nvPr/>
+        </p:nvSpPr>
+        <p:spPr>
+          <a:xfrm>
+            <a:off x="5625737" y="4482336"/>
+            <a:ext cx="532518" cy="369332"/>
+          </a:xfrm>
+          <a:prstGeom prst="rect">
+            <a:avLst/>
+          </a:prstGeom>
+          <a:noFill/>
+        </p:spPr>
+        <p:txBody>
+          <a:bodyPr wrap="none" rtlCol="0">
+            <a:spAutoFit/>
+          </a:bodyPr>
+          <a:lstStyle/>
+          <a:p>
+            <a:r>
+              <a:rPr lang="en-US" dirty="0"/>
+              <a:t>0..*</a:t>
+            </a:r>
+          </a:p>
+        </p:txBody>
+      </p:sp>
+      <p:sp>
+        <p:nvSpPr>
+          <p:cNvPr id="16" name="TextBox 15">
+            <a:extLst>
+              <a:ext uri="{FF2B5EF4-FFF2-40B4-BE49-F238E27FC236}">
+                <a16:creationId xmlns:a16="http://schemas.microsoft.com/office/drawing/2014/main" id="{97D3A049-6790-4921-ACA9-5E217F2CAE0C}"/>
+              </a:ext>
+            </a:extLst>
+          </p:cNvPr>
+          <p:cNvSpPr txBox="1"/>
+          <p:nvPr/>
+        </p:nvSpPr>
+        <p:spPr>
+          <a:xfrm>
+            <a:off x="5630739" y="5452058"/>
+            <a:ext cx="534121" cy="369332"/>
+          </a:xfrm>
+          <a:prstGeom prst="rect">
+            <a:avLst/>
+          </a:prstGeom>
+          <a:noFill/>
+        </p:spPr>
+        <p:txBody>
+          <a:bodyPr wrap="none" rtlCol="0">
+            <a:spAutoFit/>
+          </a:bodyPr>
+          <a:lstStyle/>
+          <a:p>
+            <a:r>
+              <a:rPr lang="en-US" dirty="0"/>
+              <a:t>0..1</a:t>
+            </a:r>
+          </a:p>
+        </p:txBody>
+      </p:sp>
+      <p:sp>
+        <p:nvSpPr>
+          <p:cNvPr id="3" name="Left Brace 2">
+            <a:extLst>
+              <a:ext uri="{FF2B5EF4-FFF2-40B4-BE49-F238E27FC236}">
+                <a16:creationId xmlns:a16="http://schemas.microsoft.com/office/drawing/2014/main" id="{900A3034-B647-45F7-A937-2DD7503EE9BF}"/>
+              </a:ext>
+            </a:extLst>
+          </p:cNvPr>
+          <p:cNvSpPr/>
+          <p:nvPr/>
+        </p:nvSpPr>
+        <p:spPr>
+          <a:xfrm>
+            <a:off x="4675414" y="1162586"/>
+            <a:ext cx="532518" cy="4881154"/>
+          </a:xfrm>
+          <a:prstGeom prst="leftBrace">
+            <a:avLst/>
+          </a:prstGeom>
+        </p:spPr>
+        <p:style>
+          <a:lnRef idx="1">
+            <a:schemeClr val="accent1"/>
+          </a:lnRef>
+          <a:fillRef idx="0">
+            <a:schemeClr val="accent1"/>
+          </a:fillRef>
+          <a:effectRef idx="0">
+            <a:schemeClr val="accent1"/>
+          </a:effectRef>
+          <a:fontRef idx="minor">
+            <a:schemeClr val="tx1"/>
+          </a:fontRef>
+        </p:style>
+        <p:txBody>
+          <a:bodyPr rtlCol="0" anchor="ctr"/>
+          <a:lstStyle/>
+          <a:p>
+            <a:pPr algn="ctr"/>
+            <a:endParaRPr lang="en-US"/>
+          </a:p>
+        </p:txBody>
+      </p:sp>
+    </p:spTree>
+    <p:extLst>
+      <p:ext uri="{BB962C8B-B14F-4D97-AF65-F5344CB8AC3E}">
+        <p14:creationId xmlns:p14="http://schemas.microsoft.com/office/powerpoint/2010/main" val="2484407674"/>
+      </p:ext>
+    </p:extLst>
+  </p:cSld>
+  <p:clrMapOvr>
+    <a:masterClrMapping/>
+  </p:clrMapOvr>
+</p:sld>
+</file>
+
+<file path=ppt/slides/slide8.xml><?xml version="1.0" encoding="utf-8"?>
+<p:sld xmlns:a="http://schemas.openxmlformats.org/drawingml/2006/main" xmlns:r="http://schemas.openxmlformats.org/officeDocument/2006/relationships" xmlns:p="http://schemas.openxmlformats.org/presentationml/2006/main">
+  <p:cSld>
+    <p:spTree>
+      <p:nvGrpSpPr>
+        <p:cNvPr id="1" name=""/>
+        <p:cNvGrpSpPr/>
+        <p:nvPr/>
+      </p:nvGrpSpPr>
+      <p:grpSpPr>
+        <a:xfrm>
+          <a:off x="0" y="0"/>
+          <a:ext cx="0" cy="0"/>
+          <a:chOff x="0" y="0"/>
+          <a:chExt cx="0" cy="0"/>
+        </a:xfrm>
+      </p:grpSpPr>
+      <p:sp>
+        <p:nvSpPr>
+          <p:cNvPr id="5" name="Rectangle 4">
+            <a:extLst>
+              <a:ext uri="{FF2B5EF4-FFF2-40B4-BE49-F238E27FC236}">
+                <a16:creationId xmlns:a16="http://schemas.microsoft.com/office/drawing/2014/main" id="{B82C8EC1-3A34-485F-B41F-7BB4082128B9}"/>
+              </a:ext>
+            </a:extLst>
+          </p:cNvPr>
+          <p:cNvSpPr/>
+          <p:nvPr/>
+        </p:nvSpPr>
+        <p:spPr>
+          <a:xfrm>
+            <a:off x="714102" y="483326"/>
+            <a:ext cx="10502537" cy="6135188"/>
+          </a:xfrm>
+          <a:prstGeom prst="rect">
+            <a:avLst/>
+          </a:prstGeom>
+          <a:noFill/>
+        </p:spPr>
+        <p:style>
+          <a:lnRef idx="2">
+            <a:schemeClr val="accent1">
+              <a:shade val="50000"/>
+            </a:schemeClr>
+          </a:lnRef>
+          <a:fillRef idx="1">
+            <a:schemeClr val="accent1"/>
+          </a:fillRef>
+          <a:effectRef idx="0">
+            <a:schemeClr val="accent1"/>
+          </a:effectRef>
+          <a:fontRef idx="minor">
+            <a:schemeClr val="lt1"/>
+          </a:fontRef>
+        </p:style>
+        <p:txBody>
+          <a:bodyPr rtlCol="0" anchor="ctr"/>
+          <a:lstStyle/>
+          <a:p>
+            <a:r>
+              <a:rPr lang="en-US" dirty="0" err="1">
+                <a:solidFill>
+                  <a:schemeClr val="tx1"/>
+                </a:solidFill>
+              </a:rPr>
               <a:t>ProvideDocumentBundle.Comprehensive</a:t>
             </a:r>
             <a:endParaRPr lang="en-US" dirty="0">
@@ -6587,7 +6863,7 @@
 </p:sld>
 </file>
 
-<file path=ppt/slides/slide8.xml><?xml version="1.0" encoding="utf-8"?>
+<file path=ppt/slides/slide9.xml><?xml version="1.0" encoding="utf-8"?>
 <p:sld xmlns:a="http://schemas.openxmlformats.org/drawingml/2006/main" xmlns:r="http://schemas.openxmlformats.org/officeDocument/2006/relationships" xmlns:p="http://schemas.openxmlformats.org/presentationml/2006/main">
   <p:cSld>
     <p:spTree>

</xml_diff>